<commit_message>
nuovo diario + presentazione
</commit_message>
<xml_diff>
--- a/Documentazione/Presentazione/Presentazione.pptx
+++ b/Documentazione/Presentazione/Presentazione.pptx
@@ -5,7 +5,7 @@
     <p:sldMasterId id="2147483669" r:id="rId4"/>
   </p:sldMasterIdLst>
   <p:notesMasterIdLst>
-    <p:notesMasterId r:id="rId13"/>
+    <p:notesMasterId r:id="rId15"/>
   </p:notesMasterIdLst>
   <p:sldIdLst>
     <p:sldId id="256" r:id="rId5"/>
@@ -15,7 +15,9 @@
     <p:sldId id="265" r:id="rId9"/>
     <p:sldId id="266" r:id="rId10"/>
     <p:sldId id="267" r:id="rId11"/>
-    <p:sldId id="260" r:id="rId12"/>
+    <p:sldId id="268" r:id="rId12"/>
+    <p:sldId id="269" r:id="rId13"/>
+    <p:sldId id="260" r:id="rId14"/>
   </p:sldIdLst>
   <p:sldSz cx="12192000" cy="6858000"/>
   <p:notesSz cx="6858000" cy="9144000"/>
@@ -134,6 +136,12 @@
             <p14:sldId id="265"/>
             <p14:sldId id="266"/>
             <p14:sldId id="267"/>
+          </p14:sldIdLst>
+        </p14:section>
+        <p14:section name="Implementazione" id="{7CD0CFEF-F9A1-4CEB-9348-E7BA4F238B79}">
+          <p14:sldIdLst>
+            <p14:sldId id="268"/>
+            <p14:sldId id="269"/>
             <p14:sldId id="260"/>
           </p14:sldIdLst>
         </p14:section>
@@ -228,7 +236,7 @@
           <a:p>
             <a:fld id="{1EDC063C-7640-4A26-BDD8-232605362384}" type="datetimeFigureOut">
               <a:rPr lang="it-IT" smtClean="0"/>
-              <a:t>01/02/2019</a:t>
+              <a:t>06/02/2019</a:t>
             </a:fld>
             <a:endParaRPr lang="it-IT"/>
           </a:p>
@@ -553,7 +561,7 @@
           <a:noFill/>
           <a:extLst>
             <a:ext uri="{909E8E84-426E-40dd-AFC4-6F175D3DCCD1}">
-              <a14:hiddenFill xmlns:a14="http://schemas.microsoft.com/office/drawing/2010/main" xmlns="">
+              <a14:hiddenFill xmlns="" xmlns:a14="http://schemas.microsoft.com/office/drawing/2010/main">
                 <a:solidFill>
                   <a:srgbClr val="FFFFFF"/>
                 </a:solidFill>
@@ -612,7 +620,7 @@
             </a:ln>
             <a:extLst>
               <a:ext uri="{91240B29-F687-4f45-9708-019B960494DF}">
-                <a14:hiddenLine xmlns:a14="http://schemas.microsoft.com/office/drawing/2010/main" xmlns="" w="9525">
+                <a14:hiddenLine xmlns="" xmlns:a14="http://schemas.microsoft.com/office/drawing/2010/main" w="9525">
                   <a:solidFill>
                     <a:srgbClr val="000000"/>
                   </a:solidFill>
@@ -702,7 +710,7 @@
             </a:ln>
             <a:extLst>
               <a:ext uri="{91240B29-F687-4f45-9708-019B960494DF}">
-                <a14:hiddenLine xmlns:a14="http://schemas.microsoft.com/office/drawing/2010/main" xmlns="" w="9525">
+                <a14:hiddenLine xmlns="" xmlns:a14="http://schemas.microsoft.com/office/drawing/2010/main" w="9525">
                   <a:solidFill>
                     <a:srgbClr val="000000"/>
                   </a:solidFill>
@@ -792,7 +800,7 @@
             </a:ln>
             <a:extLst>
               <a:ext uri="{91240B29-F687-4f45-9708-019B960494DF}">
-                <a14:hiddenLine xmlns:a14="http://schemas.microsoft.com/office/drawing/2010/main" xmlns="" w="9525">
+                <a14:hiddenLine xmlns="" xmlns:a14="http://schemas.microsoft.com/office/drawing/2010/main" w="9525">
                   <a:solidFill>
                     <a:srgbClr val="000000"/>
                   </a:solidFill>
@@ -826,7 +834,7 @@
             </a:ln>
             <a:extLst>
               <a:ext uri="{91240B29-F687-4f45-9708-019B960494DF}">
-                <a14:hiddenLine xmlns:a14="http://schemas.microsoft.com/office/drawing/2010/main" xmlns="" w="9525">
+                <a14:hiddenLine xmlns="" xmlns:a14="http://schemas.microsoft.com/office/drawing/2010/main" w="9525">
                   <a:solidFill>
                     <a:srgbClr val="000000"/>
                   </a:solidFill>
@@ -916,7 +924,7 @@
             </a:ln>
             <a:extLst>
               <a:ext uri="{91240B29-F687-4f45-9708-019B960494DF}">
-                <a14:hiddenLine xmlns:a14="http://schemas.microsoft.com/office/drawing/2010/main" xmlns="" w="9525">
+                <a14:hiddenLine xmlns="" xmlns:a14="http://schemas.microsoft.com/office/drawing/2010/main" w="9525">
                   <a:solidFill>
                     <a:srgbClr val="000000"/>
                   </a:solidFill>
@@ -978,7 +986,7 @@
             </a:ln>
             <a:extLst>
               <a:ext uri="{91240B29-F687-4f45-9708-019B960494DF}">
-                <a14:hiddenLine xmlns:a14="http://schemas.microsoft.com/office/drawing/2010/main" xmlns="" w="9525">
+                <a14:hiddenLine xmlns="" xmlns:a14="http://schemas.microsoft.com/office/drawing/2010/main" w="9525">
                   <a:solidFill>
                     <a:srgbClr val="000000"/>
                   </a:solidFill>
@@ -1040,7 +1048,7 @@
             </a:ln>
             <a:extLst>
               <a:ext uri="{91240B29-F687-4f45-9708-019B960494DF}">
-                <a14:hiddenLine xmlns:a14="http://schemas.microsoft.com/office/drawing/2010/main" xmlns="" w="9525">
+                <a14:hiddenLine xmlns="" xmlns:a14="http://schemas.microsoft.com/office/drawing/2010/main" w="9525">
                   <a:solidFill>
                     <a:srgbClr val="000000"/>
                   </a:solidFill>
@@ -1130,7 +1138,7 @@
             </a:ln>
             <a:extLst>
               <a:ext uri="{91240B29-F687-4f45-9708-019B960494DF}">
-                <a14:hiddenLine xmlns:a14="http://schemas.microsoft.com/office/drawing/2010/main" xmlns="" w="9525">
+                <a14:hiddenLine xmlns="" xmlns:a14="http://schemas.microsoft.com/office/drawing/2010/main" w="9525">
                   <a:solidFill>
                     <a:srgbClr val="000000"/>
                   </a:solidFill>
@@ -1192,7 +1200,7 @@
             </a:ln>
             <a:extLst>
               <a:ext uri="{91240B29-F687-4f45-9708-019B960494DF}">
-                <a14:hiddenLine xmlns:a14="http://schemas.microsoft.com/office/drawing/2010/main" xmlns="" w="9525">
+                <a14:hiddenLine xmlns="" xmlns:a14="http://schemas.microsoft.com/office/drawing/2010/main" w="9525">
                   <a:solidFill>
                     <a:srgbClr val="000000"/>
                   </a:solidFill>
@@ -1254,7 +1262,7 @@
             </a:ln>
             <a:extLst>
               <a:ext uri="{91240B29-F687-4f45-9708-019B960494DF}">
-                <a14:hiddenLine xmlns:a14="http://schemas.microsoft.com/office/drawing/2010/main" xmlns="" w="9525">
+                <a14:hiddenLine xmlns="" xmlns:a14="http://schemas.microsoft.com/office/drawing/2010/main" w="9525">
                   <a:solidFill>
                     <a:srgbClr val="000000"/>
                   </a:solidFill>
@@ -1344,7 +1352,7 @@
             </a:ln>
             <a:extLst>
               <a:ext uri="{91240B29-F687-4f45-9708-019B960494DF}">
-                <a14:hiddenLine xmlns:a14="http://schemas.microsoft.com/office/drawing/2010/main" xmlns="" w="9525">
+                <a14:hiddenLine xmlns="" xmlns:a14="http://schemas.microsoft.com/office/drawing/2010/main" w="9525">
                   <a:solidFill>
                     <a:srgbClr val="000000"/>
                   </a:solidFill>
@@ -1434,7 +1442,7 @@
             </a:ln>
             <a:extLst>
               <a:ext uri="{91240B29-F687-4f45-9708-019B960494DF}">
-                <a14:hiddenLine xmlns:a14="http://schemas.microsoft.com/office/drawing/2010/main" xmlns="" w="9525">
+                <a14:hiddenLine xmlns="" xmlns:a14="http://schemas.microsoft.com/office/drawing/2010/main" w="9525">
                   <a:solidFill>
                     <a:srgbClr val="000000"/>
                   </a:solidFill>
@@ -1496,7 +1504,7 @@
             </a:ln>
             <a:extLst>
               <a:ext uri="{91240B29-F687-4f45-9708-019B960494DF}">
-                <a14:hiddenLine xmlns:a14="http://schemas.microsoft.com/office/drawing/2010/main" xmlns="" w="9525">
+                <a14:hiddenLine xmlns="" xmlns:a14="http://schemas.microsoft.com/office/drawing/2010/main" w="9525">
                   <a:solidFill>
                     <a:srgbClr val="000000"/>
                   </a:solidFill>
@@ -1606,7 +1614,7 @@
             </a:ln>
             <a:extLst>
               <a:ext uri="{91240B29-F687-4f45-9708-019B960494DF}">
-                <a14:hiddenLine xmlns:a14="http://schemas.microsoft.com/office/drawing/2010/main" xmlns="" w="9525">
+                <a14:hiddenLine xmlns="" xmlns:a14="http://schemas.microsoft.com/office/drawing/2010/main" w="9525">
                   <a:solidFill>
                     <a:srgbClr val="000000"/>
                   </a:solidFill>
@@ -1668,7 +1676,7 @@
             </a:ln>
             <a:extLst>
               <a:ext uri="{91240B29-F687-4f45-9708-019B960494DF}">
-                <a14:hiddenLine xmlns:a14="http://schemas.microsoft.com/office/drawing/2010/main" xmlns="" w="9525">
+                <a14:hiddenLine xmlns="" xmlns:a14="http://schemas.microsoft.com/office/drawing/2010/main" w="9525">
                   <a:solidFill>
                     <a:srgbClr val="000000"/>
                   </a:solidFill>
@@ -1758,7 +1766,7 @@
             </a:ln>
             <a:extLst>
               <a:ext uri="{91240B29-F687-4f45-9708-019B960494DF}">
-                <a14:hiddenLine xmlns:a14="http://schemas.microsoft.com/office/drawing/2010/main" xmlns="" w="9525">
+                <a14:hiddenLine xmlns="" xmlns:a14="http://schemas.microsoft.com/office/drawing/2010/main" w="9525">
                   <a:solidFill>
                     <a:srgbClr val="000000"/>
                   </a:solidFill>
@@ -1848,7 +1856,7 @@
             </a:ln>
             <a:extLst>
               <a:ext uri="{91240B29-F687-4f45-9708-019B960494DF}">
-                <a14:hiddenLine xmlns:a14="http://schemas.microsoft.com/office/drawing/2010/main" xmlns="" w="9525">
+                <a14:hiddenLine xmlns="" xmlns:a14="http://schemas.microsoft.com/office/drawing/2010/main" w="9525">
                   <a:solidFill>
                     <a:srgbClr val="000000"/>
                   </a:solidFill>
@@ -1910,7 +1918,7 @@
             </a:ln>
             <a:extLst>
               <a:ext uri="{91240B29-F687-4f45-9708-019B960494DF}">
-                <a14:hiddenLine xmlns:a14="http://schemas.microsoft.com/office/drawing/2010/main" xmlns="" w="9525">
+                <a14:hiddenLine xmlns="" xmlns:a14="http://schemas.microsoft.com/office/drawing/2010/main" w="9525">
                   <a:solidFill>
                     <a:srgbClr val="000000"/>
                   </a:solidFill>
@@ -2000,7 +2008,7 @@
             </a:ln>
             <a:extLst>
               <a:ext uri="{91240B29-F687-4f45-9708-019B960494DF}">
-                <a14:hiddenLine xmlns:a14="http://schemas.microsoft.com/office/drawing/2010/main" xmlns="" w="9525">
+                <a14:hiddenLine xmlns="" xmlns:a14="http://schemas.microsoft.com/office/drawing/2010/main" w="9525">
                   <a:solidFill>
                     <a:srgbClr val="000000"/>
                   </a:solidFill>
@@ -2090,7 +2098,7 @@
             </a:ln>
             <a:extLst>
               <a:ext uri="{91240B29-F687-4f45-9708-019B960494DF}">
-                <a14:hiddenLine xmlns:a14="http://schemas.microsoft.com/office/drawing/2010/main" xmlns="" w="9525">
+                <a14:hiddenLine xmlns="" xmlns:a14="http://schemas.microsoft.com/office/drawing/2010/main" w="9525">
                   <a:solidFill>
                     <a:srgbClr val="000000"/>
                   </a:solidFill>
@@ -2146,7 +2154,7 @@
             </a:ln>
             <a:extLst>
               <a:ext uri="{91240B29-F687-4f45-9708-019B960494DF}">
-                <a14:hiddenLine xmlns:a14="http://schemas.microsoft.com/office/drawing/2010/main" xmlns="" w="9525">
+                <a14:hiddenLine xmlns="" xmlns:a14="http://schemas.microsoft.com/office/drawing/2010/main" w="9525">
                   <a:solidFill>
                     <a:srgbClr val="000000"/>
                   </a:solidFill>
@@ -2236,7 +2244,7 @@
             </a:ln>
             <a:extLst>
               <a:ext uri="{91240B29-F687-4f45-9708-019B960494DF}">
-                <a14:hiddenLine xmlns:a14="http://schemas.microsoft.com/office/drawing/2010/main" xmlns="" w="9525">
+                <a14:hiddenLine xmlns="" xmlns:a14="http://schemas.microsoft.com/office/drawing/2010/main" w="9525">
                   <a:solidFill>
                     <a:srgbClr val="000000"/>
                   </a:solidFill>
@@ -2292,7 +2300,7 @@
             </a:ln>
             <a:extLst>
               <a:ext uri="{91240B29-F687-4f45-9708-019B960494DF}">
-                <a14:hiddenLine xmlns:a14="http://schemas.microsoft.com/office/drawing/2010/main" xmlns="" w="9525">
+                <a14:hiddenLine xmlns="" xmlns:a14="http://schemas.microsoft.com/office/drawing/2010/main" w="9525">
                   <a:solidFill>
                     <a:srgbClr val="000000"/>
                   </a:solidFill>
@@ -2382,7 +2390,7 @@
             </a:ln>
             <a:extLst>
               <a:ext uri="{91240B29-F687-4f45-9708-019B960494DF}">
-                <a14:hiddenLine xmlns:a14="http://schemas.microsoft.com/office/drawing/2010/main" xmlns="" w="9525">
+                <a14:hiddenLine xmlns="" xmlns:a14="http://schemas.microsoft.com/office/drawing/2010/main" w="9525">
                   <a:solidFill>
                     <a:srgbClr val="000000"/>
                   </a:solidFill>
@@ -2450,7 +2458,7 @@
             </a:ln>
             <a:extLst>
               <a:ext uri="{91240B29-F687-4f45-9708-019B960494DF}">
-                <a14:hiddenLine xmlns:a14="http://schemas.microsoft.com/office/drawing/2010/main" xmlns="" w="9525">
+                <a14:hiddenLine xmlns="" xmlns:a14="http://schemas.microsoft.com/office/drawing/2010/main" w="9525">
                   <a:solidFill>
                     <a:srgbClr val="000000"/>
                   </a:solidFill>
@@ -2540,7 +2548,7 @@
             </a:ln>
             <a:extLst>
               <a:ext uri="{91240B29-F687-4f45-9708-019B960494DF}">
-                <a14:hiddenLine xmlns:a14="http://schemas.microsoft.com/office/drawing/2010/main" xmlns="" w="9525">
+                <a14:hiddenLine xmlns="" xmlns:a14="http://schemas.microsoft.com/office/drawing/2010/main" w="9525">
                   <a:solidFill>
                     <a:srgbClr val="000000"/>
                   </a:solidFill>
@@ -2608,7 +2616,7 @@
             </a:ln>
             <a:extLst>
               <a:ext uri="{91240B29-F687-4f45-9708-019B960494DF}">
-                <a14:hiddenLine xmlns:a14="http://schemas.microsoft.com/office/drawing/2010/main" xmlns="" w="9525">
+                <a14:hiddenLine xmlns="" xmlns:a14="http://schemas.microsoft.com/office/drawing/2010/main" w="9525">
                   <a:solidFill>
                     <a:srgbClr val="000000"/>
                   </a:solidFill>
@@ -2698,7 +2706,7 @@
             </a:ln>
             <a:extLst>
               <a:ext uri="{91240B29-F687-4f45-9708-019B960494DF}">
-                <a14:hiddenLine xmlns:a14="http://schemas.microsoft.com/office/drawing/2010/main" xmlns="" w="9525">
+                <a14:hiddenLine xmlns="" xmlns:a14="http://schemas.microsoft.com/office/drawing/2010/main" w="9525">
                   <a:solidFill>
                     <a:srgbClr val="000000"/>
                   </a:solidFill>
@@ -2732,7 +2740,7 @@
             </a:ln>
             <a:extLst>
               <a:ext uri="{91240B29-F687-4f45-9708-019B960494DF}">
-                <a14:hiddenLine xmlns:a14="http://schemas.microsoft.com/office/drawing/2010/main" xmlns="" w="9525">
+                <a14:hiddenLine xmlns="" xmlns:a14="http://schemas.microsoft.com/office/drawing/2010/main" w="9525">
                   <a:solidFill>
                     <a:srgbClr val="000000"/>
                   </a:solidFill>
@@ -2822,7 +2830,7 @@
             </a:ln>
             <a:extLst>
               <a:ext uri="{91240B29-F687-4f45-9708-019B960494DF}">
-                <a14:hiddenLine xmlns:a14="http://schemas.microsoft.com/office/drawing/2010/main" xmlns="" w="9525">
+                <a14:hiddenLine xmlns="" xmlns:a14="http://schemas.microsoft.com/office/drawing/2010/main" w="9525">
                   <a:solidFill>
                     <a:srgbClr val="000000"/>
                   </a:solidFill>
@@ -2884,7 +2892,7 @@
             </a:ln>
             <a:extLst>
               <a:ext uri="{91240B29-F687-4f45-9708-019B960494DF}">
-                <a14:hiddenLine xmlns:a14="http://schemas.microsoft.com/office/drawing/2010/main" xmlns="" w="9525">
+                <a14:hiddenLine xmlns="" xmlns:a14="http://schemas.microsoft.com/office/drawing/2010/main" w="9525">
                   <a:solidFill>
                     <a:srgbClr val="000000"/>
                   </a:solidFill>
@@ -2946,7 +2954,7 @@
             </a:ln>
             <a:extLst>
               <a:ext uri="{91240B29-F687-4f45-9708-019B960494DF}">
-                <a14:hiddenLine xmlns:a14="http://schemas.microsoft.com/office/drawing/2010/main" xmlns="" w="9525">
+                <a14:hiddenLine xmlns="" xmlns:a14="http://schemas.microsoft.com/office/drawing/2010/main" w="9525">
                   <a:solidFill>
                     <a:srgbClr val="000000"/>
                   </a:solidFill>
@@ -3036,7 +3044,7 @@
             </a:ln>
             <a:extLst>
               <a:ext uri="{91240B29-F687-4f45-9708-019B960494DF}">
-                <a14:hiddenLine xmlns:a14="http://schemas.microsoft.com/office/drawing/2010/main" xmlns="" w="9525">
+                <a14:hiddenLine xmlns="" xmlns:a14="http://schemas.microsoft.com/office/drawing/2010/main" w="9525">
                   <a:solidFill>
                     <a:srgbClr val="000000"/>
                   </a:solidFill>
@@ -3104,7 +3112,7 @@
             </a:ln>
             <a:extLst>
               <a:ext uri="{91240B29-F687-4f45-9708-019B960494DF}">
-                <a14:hiddenLine xmlns:a14="http://schemas.microsoft.com/office/drawing/2010/main" xmlns="" w="9525">
+                <a14:hiddenLine xmlns="" xmlns:a14="http://schemas.microsoft.com/office/drawing/2010/main" w="9525">
                   <a:solidFill>
                     <a:srgbClr val="000000"/>
                   </a:solidFill>
@@ -3166,7 +3174,7 @@
             </a:ln>
             <a:extLst>
               <a:ext uri="{91240B29-F687-4f45-9708-019B960494DF}">
-                <a14:hiddenLine xmlns:a14="http://schemas.microsoft.com/office/drawing/2010/main" xmlns="" w="9525">
+                <a14:hiddenLine xmlns="" xmlns:a14="http://schemas.microsoft.com/office/drawing/2010/main" w="9525">
                   <a:solidFill>
                     <a:srgbClr val="000000"/>
                   </a:solidFill>
@@ -3256,7 +3264,7 @@
             </a:ln>
             <a:extLst>
               <a:ext uri="{91240B29-F687-4f45-9708-019B960494DF}">
-                <a14:hiddenLine xmlns:a14="http://schemas.microsoft.com/office/drawing/2010/main" xmlns="" w="9525">
+                <a14:hiddenLine xmlns="" xmlns:a14="http://schemas.microsoft.com/office/drawing/2010/main" w="9525">
                   <a:solidFill>
                     <a:srgbClr val="000000"/>
                   </a:solidFill>
@@ -3318,7 +3326,7 @@
             </a:ln>
             <a:extLst>
               <a:ext uri="{91240B29-F687-4f45-9708-019B960494DF}">
-                <a14:hiddenLine xmlns:a14="http://schemas.microsoft.com/office/drawing/2010/main" xmlns="" w="9525">
+                <a14:hiddenLine xmlns="" xmlns:a14="http://schemas.microsoft.com/office/drawing/2010/main" w="9525">
                   <a:solidFill>
                     <a:srgbClr val="000000"/>
                   </a:solidFill>
@@ -3408,7 +3416,7 @@
             </a:ln>
             <a:extLst>
               <a:ext uri="{91240B29-F687-4f45-9708-019B960494DF}">
-                <a14:hiddenLine xmlns:a14="http://schemas.microsoft.com/office/drawing/2010/main" xmlns="" w="9525">
+                <a14:hiddenLine xmlns="" xmlns:a14="http://schemas.microsoft.com/office/drawing/2010/main" w="9525">
                   <a:solidFill>
                     <a:srgbClr val="000000"/>
                   </a:solidFill>
@@ -3470,7 +3478,7 @@
             </a:ln>
             <a:extLst>
               <a:ext uri="{91240B29-F687-4f45-9708-019B960494DF}">
-                <a14:hiddenLine xmlns:a14="http://schemas.microsoft.com/office/drawing/2010/main" xmlns="" w="9525">
+                <a14:hiddenLine xmlns="" xmlns:a14="http://schemas.microsoft.com/office/drawing/2010/main" w="9525">
                   <a:solidFill>
                     <a:srgbClr val="000000"/>
                   </a:solidFill>
@@ -3560,7 +3568,7 @@
             </a:ln>
             <a:extLst>
               <a:ext uri="{91240B29-F687-4f45-9708-019B960494DF}">
-                <a14:hiddenLine xmlns:a14="http://schemas.microsoft.com/office/drawing/2010/main" xmlns="" w="9525">
+                <a14:hiddenLine xmlns="" xmlns:a14="http://schemas.microsoft.com/office/drawing/2010/main" w="9525">
                   <a:solidFill>
                     <a:srgbClr val="000000"/>
                   </a:solidFill>
@@ -3594,7 +3602,7 @@
             </a:ln>
             <a:extLst>
               <a:ext uri="{91240B29-F687-4f45-9708-019B960494DF}">
-                <a14:hiddenLine xmlns:a14="http://schemas.microsoft.com/office/drawing/2010/main" xmlns="" w="9525">
+                <a14:hiddenLine xmlns="" xmlns:a14="http://schemas.microsoft.com/office/drawing/2010/main" w="9525">
                   <a:solidFill>
                     <a:srgbClr val="000000"/>
                   </a:solidFill>
@@ -3659,7 +3667,7 @@
             </a:ln>
             <a:extLst>
               <a:ext uri="{91240B29-F687-4f45-9708-019B960494DF}">
-                <a14:hiddenLine xmlns:a14="http://schemas.microsoft.com/office/drawing/2010/main" xmlns="" w="9525">
+                <a14:hiddenLine xmlns="" xmlns:a14="http://schemas.microsoft.com/office/drawing/2010/main" w="9525">
                   <a:solidFill>
                     <a:srgbClr val="000000"/>
                   </a:solidFill>
@@ -3749,7 +3757,7 @@
             </a:ln>
             <a:extLst>
               <a:ext uri="{91240B29-F687-4f45-9708-019B960494DF}">
-                <a14:hiddenLine xmlns:a14="http://schemas.microsoft.com/office/drawing/2010/main" xmlns="" w="9525">
+                <a14:hiddenLine xmlns="" xmlns:a14="http://schemas.microsoft.com/office/drawing/2010/main" w="9525">
                   <a:solidFill>
                     <a:srgbClr val="000000"/>
                   </a:solidFill>
@@ -3811,7 +3819,7 @@
             </a:ln>
             <a:extLst>
               <a:ext uri="{91240B29-F687-4f45-9708-019B960494DF}">
-                <a14:hiddenLine xmlns:a14="http://schemas.microsoft.com/office/drawing/2010/main" xmlns="" w="9525">
+                <a14:hiddenLine xmlns="" xmlns:a14="http://schemas.microsoft.com/office/drawing/2010/main" w="9525">
                   <a:solidFill>
                     <a:srgbClr val="000000"/>
                   </a:solidFill>
@@ -3901,7 +3909,7 @@
             </a:ln>
             <a:extLst>
               <a:ext uri="{91240B29-F687-4f45-9708-019B960494DF}">
-                <a14:hiddenLine xmlns:a14="http://schemas.microsoft.com/office/drawing/2010/main" xmlns="" w="9525">
+                <a14:hiddenLine xmlns="" xmlns:a14="http://schemas.microsoft.com/office/drawing/2010/main" w="9525">
                   <a:solidFill>
                     <a:srgbClr val="000000"/>
                   </a:solidFill>
@@ -3991,7 +3999,7 @@
             </a:ln>
             <a:extLst>
               <a:ext uri="{91240B29-F687-4f45-9708-019B960494DF}">
-                <a14:hiddenLine xmlns:a14="http://schemas.microsoft.com/office/drawing/2010/main" xmlns="" w="9525">
+                <a14:hiddenLine xmlns="" xmlns:a14="http://schemas.microsoft.com/office/drawing/2010/main" w="9525">
                   <a:solidFill>
                     <a:srgbClr val="000000"/>
                   </a:solidFill>
@@ -4056,7 +4064,7 @@
             </a:ln>
             <a:extLst>
               <a:ext uri="{91240B29-F687-4f45-9708-019B960494DF}">
-                <a14:hiddenLine xmlns:a14="http://schemas.microsoft.com/office/drawing/2010/main" xmlns="" w="9525">
+                <a14:hiddenLine xmlns="" xmlns:a14="http://schemas.microsoft.com/office/drawing/2010/main" w="9525">
                   <a:solidFill>
                     <a:srgbClr val="000000"/>
                   </a:solidFill>
@@ -4118,7 +4126,7 @@
             </a:ln>
             <a:extLst>
               <a:ext uri="{91240B29-F687-4f45-9708-019B960494DF}">
-                <a14:hiddenLine xmlns:a14="http://schemas.microsoft.com/office/drawing/2010/main" xmlns="" w="9525">
+                <a14:hiddenLine xmlns="" xmlns:a14="http://schemas.microsoft.com/office/drawing/2010/main" w="9525">
                   <a:solidFill>
                     <a:srgbClr val="000000"/>
                   </a:solidFill>
@@ -4208,7 +4216,7 @@
             </a:ln>
             <a:extLst>
               <a:ext uri="{91240B29-F687-4f45-9708-019B960494DF}">
-                <a14:hiddenLine xmlns:a14="http://schemas.microsoft.com/office/drawing/2010/main" xmlns="" w="9525">
+                <a14:hiddenLine xmlns="" xmlns:a14="http://schemas.microsoft.com/office/drawing/2010/main" w="9525">
                   <a:solidFill>
                     <a:srgbClr val="000000"/>
                   </a:solidFill>
@@ -4298,7 +4306,7 @@
             </a:ln>
             <a:extLst>
               <a:ext uri="{91240B29-F687-4f45-9708-019B960494DF}">
-                <a14:hiddenLine xmlns:a14="http://schemas.microsoft.com/office/drawing/2010/main" xmlns="" w="9525">
+                <a14:hiddenLine xmlns="" xmlns:a14="http://schemas.microsoft.com/office/drawing/2010/main" w="9525">
                   <a:solidFill>
                     <a:srgbClr val="000000"/>
                   </a:solidFill>
@@ -4360,7 +4368,7 @@
             </a:ln>
             <a:extLst>
               <a:ext uri="{91240B29-F687-4f45-9708-019B960494DF}">
-                <a14:hiddenLine xmlns:a14="http://schemas.microsoft.com/office/drawing/2010/main" xmlns="" w="9525">
+                <a14:hiddenLine xmlns="" xmlns:a14="http://schemas.microsoft.com/office/drawing/2010/main" w="9525">
                   <a:solidFill>
                     <a:srgbClr val="000000"/>
                   </a:solidFill>
@@ -4480,7 +4488,7 @@
             </a:ln>
             <a:extLst>
               <a:ext uri="{91240B29-F687-4f45-9708-019B960494DF}">
-                <a14:hiddenLine xmlns:a14="http://schemas.microsoft.com/office/drawing/2010/main" xmlns="" w="9525">
+                <a14:hiddenLine xmlns="" xmlns:a14="http://schemas.microsoft.com/office/drawing/2010/main" w="9525">
                   <a:solidFill>
                     <a:srgbClr val="000000"/>
                   </a:solidFill>
@@ -4548,7 +4556,7 @@
             </a:ln>
             <a:extLst>
               <a:ext uri="{91240B29-F687-4f45-9708-019B960494DF}">
-                <a14:hiddenLine xmlns:a14="http://schemas.microsoft.com/office/drawing/2010/main" xmlns="" w="9525">
+                <a14:hiddenLine xmlns="" xmlns:a14="http://schemas.microsoft.com/office/drawing/2010/main" w="9525">
                   <a:solidFill>
                     <a:srgbClr val="000000"/>
                   </a:solidFill>
@@ -4638,7 +4646,7 @@
             </a:ln>
             <a:extLst>
               <a:ext uri="{91240B29-F687-4f45-9708-019B960494DF}">
-                <a14:hiddenLine xmlns:a14="http://schemas.microsoft.com/office/drawing/2010/main" xmlns="" w="9525">
+                <a14:hiddenLine xmlns="" xmlns:a14="http://schemas.microsoft.com/office/drawing/2010/main" w="9525">
                   <a:solidFill>
                     <a:srgbClr val="000000"/>
                   </a:solidFill>
@@ -4778,7 +4786,7 @@
           <a:p>
             <a:fld id="{48A87A34-81AB-432B-8DAE-1953F412C126}" type="datetimeFigureOut">
               <a:rPr lang="en-US" smtClean="0"/>
-              <a:t>2/1/2019</a:t>
+              <a:t>2/6/2019</a:t>
             </a:fld>
             <a:endParaRPr lang="en-US" dirty="0"/>
           </a:p>
@@ -5045,7 +5053,7 @@
           <a:p>
             <a:fld id="{48A87A34-81AB-432B-8DAE-1953F412C126}" type="datetimeFigureOut">
               <a:rPr lang="en-US" smtClean="0"/>
-              <a:t>2/1/2019</a:t>
+              <a:t>2/6/2019</a:t>
             </a:fld>
             <a:endParaRPr lang="en-US" dirty="0"/>
           </a:p>
@@ -5241,7 +5249,7 @@
           <a:p>
             <a:fld id="{48A87A34-81AB-432B-8DAE-1953F412C126}" type="datetimeFigureOut">
               <a:rPr lang="en-US" smtClean="0"/>
-              <a:t>2/1/2019</a:t>
+              <a:t>2/6/2019</a:t>
             </a:fld>
             <a:endParaRPr lang="en-US" dirty="0"/>
           </a:p>
@@ -5504,7 +5512,7 @@
           <a:p>
             <a:fld id="{48A87A34-81AB-432B-8DAE-1953F412C126}" type="datetimeFigureOut">
               <a:rPr lang="en-US" smtClean="0"/>
-              <a:t>2/1/2019</a:t>
+              <a:t>2/6/2019</a:t>
             </a:fld>
             <a:endParaRPr lang="en-US" dirty="0"/>
           </a:p>
@@ -5938,7 +5946,7 @@
           <a:p>
             <a:fld id="{48A87A34-81AB-432B-8DAE-1953F412C126}" type="datetimeFigureOut">
               <a:rPr lang="en-US" smtClean="0"/>
-              <a:t>2/1/2019</a:t>
+              <a:t>2/6/2019</a:t>
             </a:fld>
             <a:endParaRPr lang="en-US" dirty="0"/>
           </a:p>
@@ -6484,7 +6492,7 @@
           <a:p>
             <a:fld id="{48A87A34-81AB-432B-8DAE-1953F412C126}" type="datetimeFigureOut">
               <a:rPr lang="en-US" smtClean="0"/>
-              <a:t>2/1/2019</a:t>
+              <a:t>2/6/2019</a:t>
             </a:fld>
             <a:endParaRPr lang="en-US" dirty="0"/>
           </a:p>
@@ -7204,7 +7212,7 @@
           <a:p>
             <a:fld id="{48A87A34-81AB-432B-8DAE-1953F412C126}" type="datetimeFigureOut">
               <a:rPr lang="en-US" smtClean="0"/>
-              <a:t>2/1/2019</a:t>
+              <a:t>2/6/2019</a:t>
             </a:fld>
             <a:endParaRPr lang="en-US" dirty="0"/>
           </a:p>
@@ -7374,7 +7382,7 @@
           <a:p>
             <a:fld id="{48A87A34-81AB-432B-8DAE-1953F412C126}" type="datetimeFigureOut">
               <a:rPr lang="en-US" smtClean="0"/>
-              <a:t>2/1/2019</a:t>
+              <a:t>2/6/2019</a:t>
             </a:fld>
             <a:endParaRPr lang="en-US" dirty="0"/>
           </a:p>
@@ -7554,7 +7562,7 @@
           <a:p>
             <a:fld id="{48A87A34-81AB-432B-8DAE-1953F412C126}" type="datetimeFigureOut">
               <a:rPr lang="en-US" smtClean="0"/>
-              <a:t>2/1/2019</a:t>
+              <a:t>2/6/2019</a:t>
             </a:fld>
             <a:endParaRPr lang="en-US" dirty="0"/>
           </a:p>
@@ -7724,7 +7732,7 @@
           <a:p>
             <a:fld id="{48A87A34-81AB-432B-8DAE-1953F412C126}" type="datetimeFigureOut">
               <a:rPr lang="en-US" smtClean="0"/>
-              <a:t>2/1/2019</a:t>
+              <a:t>2/6/2019</a:t>
             </a:fld>
             <a:endParaRPr lang="en-US" dirty="0"/>
           </a:p>
@@ -7974,7 +7982,7 @@
           <a:p>
             <a:fld id="{48A87A34-81AB-432B-8DAE-1953F412C126}" type="datetimeFigureOut">
               <a:rPr lang="en-US" smtClean="0"/>
-              <a:t>2/1/2019</a:t>
+              <a:t>2/6/2019</a:t>
             </a:fld>
             <a:endParaRPr lang="en-US" dirty="0"/>
           </a:p>
@@ -8206,7 +8214,7 @@
           <a:p>
             <a:fld id="{48A87A34-81AB-432B-8DAE-1953F412C126}" type="datetimeFigureOut">
               <a:rPr lang="en-US" smtClean="0"/>
-              <a:t>2/1/2019</a:t>
+              <a:t>2/6/2019</a:t>
             </a:fld>
             <a:endParaRPr lang="en-US" dirty="0"/>
           </a:p>
@@ -8587,7 +8595,7 @@
           <a:p>
             <a:fld id="{48A87A34-81AB-432B-8DAE-1953F412C126}" type="datetimeFigureOut">
               <a:rPr lang="en-US" smtClean="0"/>
-              <a:t>2/1/2019</a:t>
+              <a:t>2/6/2019</a:t>
             </a:fld>
             <a:endParaRPr lang="en-US" dirty="0"/>
           </a:p>
@@ -8705,7 +8713,7 @@
           <a:p>
             <a:fld id="{48A87A34-81AB-432B-8DAE-1953F412C126}" type="datetimeFigureOut">
               <a:rPr lang="en-US" smtClean="0"/>
-              <a:t>2/1/2019</a:t>
+              <a:t>2/6/2019</a:t>
             </a:fld>
             <a:endParaRPr lang="en-US" dirty="0"/>
           </a:p>
@@ -8800,7 +8808,7 @@
           <a:p>
             <a:fld id="{48A87A34-81AB-432B-8DAE-1953F412C126}" type="datetimeFigureOut">
               <a:rPr lang="en-US" smtClean="0"/>
-              <a:t>2/1/2019</a:t>
+              <a:t>2/6/2019</a:t>
             </a:fld>
             <a:endParaRPr lang="en-US" dirty="0"/>
           </a:p>
@@ -9049,7 +9057,7 @@
           <a:p>
             <a:fld id="{48A87A34-81AB-432B-8DAE-1953F412C126}" type="datetimeFigureOut">
               <a:rPr lang="en-US" smtClean="0"/>
-              <a:t>2/1/2019</a:t>
+              <a:t>2/6/2019</a:t>
             </a:fld>
             <a:endParaRPr lang="en-US" dirty="0"/>
           </a:p>
@@ -9329,7 +9337,7 @@
           <a:p>
             <a:fld id="{48A87A34-81AB-432B-8DAE-1953F412C126}" type="datetimeFigureOut">
               <a:rPr lang="en-US" smtClean="0"/>
-              <a:t>2/1/2019</a:t>
+              <a:t>2/6/2019</a:t>
             </a:fld>
             <a:endParaRPr lang="en-US" dirty="0"/>
           </a:p>
@@ -9452,7 +9460,7 @@
           <a:noFill/>
           <a:extLst>
             <a:ext uri="{909E8E84-426E-40dd-AFC4-6F175D3DCCD1}">
-              <a14:hiddenFill xmlns:a14="http://schemas.microsoft.com/office/drawing/2010/main" xmlns="">
+              <a14:hiddenFill xmlns="" xmlns:a14="http://schemas.microsoft.com/office/drawing/2010/main">
                 <a:solidFill>
                   <a:srgbClr val="FFFFFF"/>
                 </a:solidFill>
@@ -9526,7 +9534,7 @@
               </a:ln>
               <a:extLst>
                 <a:ext uri="{91240B29-F687-4f45-9708-019B960494DF}">
-                  <a14:hiddenLine xmlns:a14="http://schemas.microsoft.com/office/drawing/2010/main" xmlns="" w="9525">
+                  <a14:hiddenLine xmlns="" xmlns:a14="http://schemas.microsoft.com/office/drawing/2010/main" w="9525">
                     <a:solidFill>
                       <a:srgbClr val="000000"/>
                     </a:solidFill>
@@ -9616,7 +9624,7 @@
               </a:ln>
               <a:extLst>
                 <a:ext uri="{91240B29-F687-4f45-9708-019B960494DF}">
-                  <a14:hiddenLine xmlns:a14="http://schemas.microsoft.com/office/drawing/2010/main" xmlns="" w="9525">
+                  <a14:hiddenLine xmlns="" xmlns:a14="http://schemas.microsoft.com/office/drawing/2010/main" w="9525">
                     <a:solidFill>
                       <a:srgbClr val="000000"/>
                     </a:solidFill>
@@ -9706,7 +9714,7 @@
               </a:ln>
               <a:extLst>
                 <a:ext uri="{91240B29-F687-4f45-9708-019B960494DF}">
-                  <a14:hiddenLine xmlns:a14="http://schemas.microsoft.com/office/drawing/2010/main" xmlns="" w="9525">
+                  <a14:hiddenLine xmlns="" xmlns:a14="http://schemas.microsoft.com/office/drawing/2010/main" w="9525">
                     <a:solidFill>
                       <a:srgbClr val="000000"/>
                     </a:solidFill>
@@ -9768,7 +9776,7 @@
               </a:ln>
               <a:extLst>
                 <a:ext uri="{91240B29-F687-4f45-9708-019B960494DF}">
-                  <a14:hiddenLine xmlns:a14="http://schemas.microsoft.com/office/drawing/2010/main" xmlns="" w="9525">
+                  <a14:hiddenLine xmlns="" xmlns:a14="http://schemas.microsoft.com/office/drawing/2010/main" w="9525">
                     <a:solidFill>
                       <a:srgbClr val="000000"/>
                     </a:solidFill>
@@ -9858,7 +9866,7 @@
               </a:ln>
               <a:extLst>
                 <a:ext uri="{91240B29-F687-4f45-9708-019B960494DF}">
-                  <a14:hiddenLine xmlns:a14="http://schemas.microsoft.com/office/drawing/2010/main" xmlns="" w="9525">
+                  <a14:hiddenLine xmlns="" xmlns:a14="http://schemas.microsoft.com/office/drawing/2010/main" w="9525">
                     <a:solidFill>
                       <a:srgbClr val="000000"/>
                     </a:solidFill>
@@ -9920,7 +9928,7 @@
               </a:ln>
               <a:extLst>
                 <a:ext uri="{91240B29-F687-4f45-9708-019B960494DF}">
-                  <a14:hiddenLine xmlns:a14="http://schemas.microsoft.com/office/drawing/2010/main" xmlns="" w="9525">
+                  <a14:hiddenLine xmlns="" xmlns:a14="http://schemas.microsoft.com/office/drawing/2010/main" w="9525">
                     <a:solidFill>
                       <a:srgbClr val="000000"/>
                     </a:solidFill>
@@ -9982,7 +9990,7 @@
               </a:ln>
               <a:extLst>
                 <a:ext uri="{91240B29-F687-4f45-9708-019B960494DF}">
-                  <a14:hiddenLine xmlns:a14="http://schemas.microsoft.com/office/drawing/2010/main" xmlns="" w="9525">
+                  <a14:hiddenLine xmlns="" xmlns:a14="http://schemas.microsoft.com/office/drawing/2010/main" w="9525">
                     <a:solidFill>
                       <a:srgbClr val="000000"/>
                     </a:solidFill>
@@ -10072,7 +10080,7 @@
               </a:ln>
               <a:extLst>
                 <a:ext uri="{91240B29-F687-4f45-9708-019B960494DF}">
-                  <a14:hiddenLine xmlns:a14="http://schemas.microsoft.com/office/drawing/2010/main" xmlns="" w="9525">
+                  <a14:hiddenLine xmlns="" xmlns:a14="http://schemas.microsoft.com/office/drawing/2010/main" w="9525">
                     <a:solidFill>
                       <a:srgbClr val="000000"/>
                     </a:solidFill>
@@ -10162,7 +10170,7 @@
               </a:ln>
               <a:extLst>
                 <a:ext uri="{91240B29-F687-4f45-9708-019B960494DF}">
-                  <a14:hiddenLine xmlns:a14="http://schemas.microsoft.com/office/drawing/2010/main" xmlns="" w="9525">
+                  <a14:hiddenLine xmlns="" xmlns:a14="http://schemas.microsoft.com/office/drawing/2010/main" w="9525">
                     <a:solidFill>
                       <a:srgbClr val="000000"/>
                     </a:solidFill>
@@ -10224,7 +10232,7 @@
               </a:ln>
               <a:extLst>
                 <a:ext uri="{91240B29-F687-4f45-9708-019B960494DF}">
-                  <a14:hiddenLine xmlns:a14="http://schemas.microsoft.com/office/drawing/2010/main" xmlns="" w="9525">
+                  <a14:hiddenLine xmlns="" xmlns:a14="http://schemas.microsoft.com/office/drawing/2010/main" w="9525">
                     <a:solidFill>
                       <a:srgbClr val="000000"/>
                     </a:solidFill>
@@ -10334,7 +10342,7 @@
               </a:ln>
               <a:extLst>
                 <a:ext uri="{91240B29-F687-4f45-9708-019B960494DF}">
-                  <a14:hiddenLine xmlns:a14="http://schemas.microsoft.com/office/drawing/2010/main" xmlns="" w="9525">
+                  <a14:hiddenLine xmlns="" xmlns:a14="http://schemas.microsoft.com/office/drawing/2010/main" w="9525">
                     <a:solidFill>
                       <a:srgbClr val="000000"/>
                     </a:solidFill>
@@ -10418,7 +10426,7 @@
               </a:ln>
               <a:extLst>
                 <a:ext uri="{91240B29-F687-4f45-9708-019B960494DF}">
-                  <a14:hiddenLine xmlns:a14="http://schemas.microsoft.com/office/drawing/2010/main" xmlns="" w="9525">
+                  <a14:hiddenLine xmlns="" xmlns:a14="http://schemas.microsoft.com/office/drawing/2010/main" w="9525">
                     <a:solidFill>
                       <a:srgbClr val="000000"/>
                     </a:solidFill>
@@ -10480,7 +10488,7 @@
               </a:ln>
               <a:extLst>
                 <a:ext uri="{91240B29-F687-4f45-9708-019B960494DF}">
-                  <a14:hiddenLine xmlns:a14="http://schemas.microsoft.com/office/drawing/2010/main" xmlns="" w="9525">
+                  <a14:hiddenLine xmlns="" xmlns:a14="http://schemas.microsoft.com/office/drawing/2010/main" w="9525">
                     <a:solidFill>
                       <a:srgbClr val="000000"/>
                     </a:solidFill>
@@ -10542,7 +10550,7 @@
               </a:ln>
               <a:extLst>
                 <a:ext uri="{91240B29-F687-4f45-9708-019B960494DF}">
-                  <a14:hiddenLine xmlns:a14="http://schemas.microsoft.com/office/drawing/2010/main" xmlns="" w="9525">
+                  <a14:hiddenLine xmlns="" xmlns:a14="http://schemas.microsoft.com/office/drawing/2010/main" w="9525">
                     <a:solidFill>
                       <a:srgbClr val="000000"/>
                     </a:solidFill>
@@ -10632,7 +10640,7 @@
               </a:ln>
               <a:extLst>
                 <a:ext uri="{91240B29-F687-4f45-9708-019B960494DF}">
-                  <a14:hiddenLine xmlns:a14="http://schemas.microsoft.com/office/drawing/2010/main" xmlns="" w="9525">
+                  <a14:hiddenLine xmlns="" xmlns:a14="http://schemas.microsoft.com/office/drawing/2010/main" w="9525">
                     <a:solidFill>
                       <a:srgbClr val="000000"/>
                     </a:solidFill>
@@ -10666,7 +10674,7 @@
               </a:ln>
               <a:extLst>
                 <a:ext uri="{91240B29-F687-4f45-9708-019B960494DF}">
-                  <a14:hiddenLine xmlns:a14="http://schemas.microsoft.com/office/drawing/2010/main" xmlns="" w="9525">
+                  <a14:hiddenLine xmlns="" xmlns:a14="http://schemas.microsoft.com/office/drawing/2010/main" w="9525">
                     <a:solidFill>
                       <a:srgbClr val="000000"/>
                     </a:solidFill>
@@ -10731,7 +10739,7 @@
               </a:ln>
               <a:extLst>
                 <a:ext uri="{91240B29-F687-4f45-9708-019B960494DF}">
-                  <a14:hiddenLine xmlns:a14="http://schemas.microsoft.com/office/drawing/2010/main" xmlns="" w="9525">
+                  <a14:hiddenLine xmlns="" xmlns:a14="http://schemas.microsoft.com/office/drawing/2010/main" w="9525">
                     <a:solidFill>
                       <a:srgbClr val="000000"/>
                     </a:solidFill>
@@ -10821,7 +10829,7 @@
               </a:ln>
               <a:extLst>
                 <a:ext uri="{91240B29-F687-4f45-9708-019B960494DF}">
-                  <a14:hiddenLine xmlns:a14="http://schemas.microsoft.com/office/drawing/2010/main" xmlns="" w="9525">
+                  <a14:hiddenLine xmlns="" xmlns:a14="http://schemas.microsoft.com/office/drawing/2010/main" w="9525">
                     <a:solidFill>
                       <a:srgbClr val="000000"/>
                     </a:solidFill>
@@ -10883,7 +10891,7 @@
               </a:ln>
               <a:extLst>
                 <a:ext uri="{91240B29-F687-4f45-9708-019B960494DF}">
-                  <a14:hiddenLine xmlns:a14="http://schemas.microsoft.com/office/drawing/2010/main" xmlns="" w="9525">
+                  <a14:hiddenLine xmlns="" xmlns:a14="http://schemas.microsoft.com/office/drawing/2010/main" w="9525">
                     <a:solidFill>
                       <a:srgbClr val="000000"/>
                     </a:solidFill>
@@ -10973,7 +10981,7 @@
               </a:ln>
               <a:extLst>
                 <a:ext uri="{91240B29-F687-4f45-9708-019B960494DF}">
-                  <a14:hiddenLine xmlns:a14="http://schemas.microsoft.com/office/drawing/2010/main" xmlns="" w="9525">
+                  <a14:hiddenLine xmlns="" xmlns:a14="http://schemas.microsoft.com/office/drawing/2010/main" w="9525">
                     <a:solidFill>
                       <a:srgbClr val="000000"/>
                     </a:solidFill>
@@ -11038,7 +11046,7 @@
               </a:ln>
               <a:extLst>
                 <a:ext uri="{91240B29-F687-4f45-9708-019B960494DF}">
-                  <a14:hiddenLine xmlns:a14="http://schemas.microsoft.com/office/drawing/2010/main" xmlns="" w="9525">
+                  <a14:hiddenLine xmlns="" xmlns:a14="http://schemas.microsoft.com/office/drawing/2010/main" w="9525">
                     <a:solidFill>
                       <a:srgbClr val="000000"/>
                     </a:solidFill>
@@ -11100,7 +11108,7 @@
               </a:ln>
               <a:extLst>
                 <a:ext uri="{91240B29-F687-4f45-9708-019B960494DF}">
-                  <a14:hiddenLine xmlns:a14="http://schemas.microsoft.com/office/drawing/2010/main" xmlns="" w="9525">
+                  <a14:hiddenLine xmlns="" xmlns:a14="http://schemas.microsoft.com/office/drawing/2010/main" w="9525">
                     <a:solidFill>
                       <a:srgbClr val="000000"/>
                     </a:solidFill>
@@ -11190,7 +11198,7 @@
               </a:ln>
               <a:extLst>
                 <a:ext uri="{91240B29-F687-4f45-9708-019B960494DF}">
-                  <a14:hiddenLine xmlns:a14="http://schemas.microsoft.com/office/drawing/2010/main" xmlns="" w="9525">
+                  <a14:hiddenLine xmlns="" xmlns:a14="http://schemas.microsoft.com/office/drawing/2010/main" w="9525">
                     <a:solidFill>
                       <a:srgbClr val="000000"/>
                     </a:solidFill>
@@ -11280,7 +11288,7 @@
               </a:ln>
               <a:extLst>
                 <a:ext uri="{91240B29-F687-4f45-9708-019B960494DF}">
-                  <a14:hiddenLine xmlns:a14="http://schemas.microsoft.com/office/drawing/2010/main" xmlns="" w="9525">
+                  <a14:hiddenLine xmlns="" xmlns:a14="http://schemas.microsoft.com/office/drawing/2010/main" w="9525">
                     <a:solidFill>
                       <a:srgbClr val="000000"/>
                     </a:solidFill>
@@ -11345,7 +11353,7 @@
               </a:ln>
               <a:extLst>
                 <a:ext uri="{91240B29-F687-4f45-9708-019B960494DF}">
-                  <a14:hiddenLine xmlns:a14="http://schemas.microsoft.com/office/drawing/2010/main" xmlns="" w="9525">
+                  <a14:hiddenLine xmlns="" xmlns:a14="http://schemas.microsoft.com/office/drawing/2010/main" w="9525">
                     <a:solidFill>
                       <a:srgbClr val="000000"/>
                     </a:solidFill>
@@ -11465,7 +11473,7 @@
               </a:ln>
               <a:extLst>
                 <a:ext uri="{91240B29-F687-4f45-9708-019B960494DF}">
-                  <a14:hiddenLine xmlns:a14="http://schemas.microsoft.com/office/drawing/2010/main" xmlns="" w="9525">
+                  <a14:hiddenLine xmlns="" xmlns:a14="http://schemas.microsoft.com/office/drawing/2010/main" w="9525">
                     <a:solidFill>
                       <a:srgbClr val="000000"/>
                     </a:solidFill>
@@ -11546,7 +11554,7 @@
               </a:ln>
               <a:extLst>
                 <a:ext uri="{91240B29-F687-4f45-9708-019B960494DF}">
-                  <a14:hiddenLine xmlns:a14="http://schemas.microsoft.com/office/drawing/2010/main" xmlns="" w="9525">
+                  <a14:hiddenLine xmlns="" xmlns:a14="http://schemas.microsoft.com/office/drawing/2010/main" w="9525">
                     <a:solidFill>
                       <a:srgbClr val="000000"/>
                     </a:solidFill>
@@ -11661,7 +11669,7 @@
               </a:ln>
               <a:extLst>
                 <a:ext uri="{91240B29-F687-4f45-9708-019B960494DF}">
-                  <a14:hiddenLine xmlns:a14="http://schemas.microsoft.com/office/drawing/2010/main" xmlns="" w="9525">
+                  <a14:hiddenLine xmlns="" xmlns:a14="http://schemas.microsoft.com/office/drawing/2010/main" w="9525">
                     <a:solidFill>
                       <a:srgbClr val="000000"/>
                     </a:solidFill>
@@ -11751,7 +11759,7 @@
               </a:ln>
               <a:extLst>
                 <a:ext uri="{91240B29-F687-4f45-9708-019B960494DF}">
-                  <a14:hiddenLine xmlns:a14="http://schemas.microsoft.com/office/drawing/2010/main" xmlns="" w="9525">
+                  <a14:hiddenLine xmlns="" xmlns:a14="http://schemas.microsoft.com/office/drawing/2010/main" w="9525">
                     <a:solidFill>
                       <a:srgbClr val="000000"/>
                     </a:solidFill>
@@ -11816,7 +11824,7 @@
               </a:ln>
               <a:extLst>
                 <a:ext uri="{91240B29-F687-4f45-9708-019B960494DF}">
-                  <a14:hiddenLine xmlns:a14="http://schemas.microsoft.com/office/drawing/2010/main" xmlns="" w="9525">
+                  <a14:hiddenLine xmlns="" xmlns:a14="http://schemas.microsoft.com/office/drawing/2010/main" w="9525">
                     <a:solidFill>
                       <a:srgbClr val="000000"/>
                     </a:solidFill>
@@ -11906,7 +11914,7 @@
               </a:ln>
               <a:extLst>
                 <a:ext uri="{91240B29-F687-4f45-9708-019B960494DF}">
-                  <a14:hiddenLine xmlns:a14="http://schemas.microsoft.com/office/drawing/2010/main" xmlns="" w="9525">
+                  <a14:hiddenLine xmlns="" xmlns:a14="http://schemas.microsoft.com/office/drawing/2010/main" w="9525">
                     <a:solidFill>
                       <a:srgbClr val="000000"/>
                     </a:solidFill>
@@ -11974,7 +11982,7 @@
               </a:ln>
               <a:extLst>
                 <a:ext uri="{91240B29-F687-4f45-9708-019B960494DF}">
-                  <a14:hiddenLine xmlns:a14="http://schemas.microsoft.com/office/drawing/2010/main" xmlns="" w="9525">
+                  <a14:hiddenLine xmlns="" xmlns:a14="http://schemas.microsoft.com/office/drawing/2010/main" w="9525">
                     <a:solidFill>
                       <a:srgbClr val="000000"/>
                     </a:solidFill>
@@ -12064,7 +12072,7 @@
               </a:ln>
               <a:extLst>
                 <a:ext uri="{91240B29-F687-4f45-9708-019B960494DF}">
-                  <a14:hiddenLine xmlns:a14="http://schemas.microsoft.com/office/drawing/2010/main" xmlns="" w="9525">
+                  <a14:hiddenLine xmlns="" xmlns:a14="http://schemas.microsoft.com/office/drawing/2010/main" w="9525">
                     <a:solidFill>
                       <a:srgbClr val="000000"/>
                     </a:solidFill>
@@ -12132,7 +12140,7 @@
               </a:ln>
               <a:extLst>
                 <a:ext uri="{91240B29-F687-4f45-9708-019B960494DF}">
-                  <a14:hiddenLine xmlns:a14="http://schemas.microsoft.com/office/drawing/2010/main" xmlns="" w="9525">
+                  <a14:hiddenLine xmlns="" xmlns:a14="http://schemas.microsoft.com/office/drawing/2010/main" w="9525">
                     <a:solidFill>
                       <a:srgbClr val="000000"/>
                     </a:solidFill>
@@ -12222,7 +12230,7 @@
               </a:ln>
               <a:extLst>
                 <a:ext uri="{91240B29-F687-4f45-9708-019B960494DF}">
-                  <a14:hiddenLine xmlns:a14="http://schemas.microsoft.com/office/drawing/2010/main" xmlns="" w="9525">
+                  <a14:hiddenLine xmlns="" xmlns:a14="http://schemas.microsoft.com/office/drawing/2010/main" w="9525">
                     <a:solidFill>
                       <a:srgbClr val="000000"/>
                     </a:solidFill>
@@ -12256,7 +12264,7 @@
               </a:ln>
               <a:extLst>
                 <a:ext uri="{91240B29-F687-4f45-9708-019B960494DF}">
-                  <a14:hiddenLine xmlns:a14="http://schemas.microsoft.com/office/drawing/2010/main" xmlns="" w="9525">
+                  <a14:hiddenLine xmlns="" xmlns:a14="http://schemas.microsoft.com/office/drawing/2010/main" w="9525">
                     <a:solidFill>
                       <a:srgbClr val="000000"/>
                     </a:solidFill>
@@ -12397,7 +12405,7 @@
             <a:fld id="{48A87A34-81AB-432B-8DAE-1953F412C126}" type="datetimeFigureOut">
               <a:rPr lang="en-US" smtClean="0"/>
               <a:pPr/>
-              <a:t>2/1/2019</a:t>
+              <a:t>2/6/2019</a:t>
             </a:fld>
             <a:endParaRPr lang="en-US" dirty="0"/>
           </a:p>
@@ -12991,7 +12999,7 @@
             <a:noFill/>
             <a:extLst>
               <a:ext uri="{909E8E84-426E-40dd-AFC4-6F175D3DCCD1}">
-                <a14:hiddenFill xmlns:p14="http://schemas.microsoft.com/office/powerpoint/2010/main" xmlns:a14="http://schemas.microsoft.com/office/drawing/2010/main" xmlns:a16="http://schemas.microsoft.com/office/drawing/2014/main" xmlns="">
+                <a14:hiddenFill xmlns="" xmlns:a16="http://schemas.microsoft.com/office/drawing/2014/main" xmlns:a14="http://schemas.microsoft.com/office/drawing/2010/main" xmlns:p14="http://schemas.microsoft.com/office/powerpoint/2010/main">
                   <a:solidFill>
                     <a:srgbClr val="FFFFFF"/>
                   </a:solidFill>
@@ -15279,6 +15287,140 @@
 </p:sld>
 </file>
 
+<file path=ppt/slides/slide10.xml><?xml version="1.0" encoding="utf-8"?>
+<p:sld xmlns:a="http://schemas.openxmlformats.org/drawingml/2006/main" xmlns:r="http://schemas.openxmlformats.org/officeDocument/2006/relationships" xmlns:p="http://schemas.openxmlformats.org/presentationml/2006/main">
+  <p:cSld>
+    <p:spTree>
+      <p:nvGrpSpPr>
+        <p:cNvPr id="1" name=""/>
+        <p:cNvGrpSpPr/>
+        <p:nvPr/>
+      </p:nvGrpSpPr>
+      <p:grpSpPr>
+        <a:xfrm>
+          <a:off x="0" y="0"/>
+          <a:ext cx="0" cy="0"/>
+          <a:chOff x="0" y="0"/>
+          <a:chExt cx="0" cy="0"/>
+        </a:xfrm>
+      </p:grpSpPr>
+      <p:sp>
+        <p:nvSpPr>
+          <p:cNvPr id="2" name="Title 1">
+            <a:extLst>
+              <a:ext uri="{FF2B5EF4-FFF2-40B4-BE49-F238E27FC236}">
+                <a16:creationId xmlns:a16="http://schemas.microsoft.com/office/drawing/2014/main" id="{7ADC9467-D86A-4D44-9E01-5796E5BDA396}"/>
+              </a:ext>
+            </a:extLst>
+          </p:cNvPr>
+          <p:cNvSpPr>
+            <a:spLocks noGrp="1"/>
+          </p:cNvSpPr>
+          <p:nvPr>
+            <p:ph type="title"/>
+          </p:nvPr>
+        </p:nvSpPr>
+        <p:spPr/>
+        <p:txBody>
+          <a:bodyPr anchor="ctr"/>
+          <a:lstStyle/>
+          <a:p>
+            <a:pPr algn="ctr"/>
+            <a:r>
+              <a:rPr lang="en-US" dirty="0"/>
+              <a:t>  Contact details	</a:t>
+            </a:r>
+          </a:p>
+        </p:txBody>
+      </p:sp>
+      <p:pic>
+        <p:nvPicPr>
+          <p:cNvPr id="6" name="Picture Placeholder 5" descr="Circuit">
+            <a:extLst>
+              <a:ext uri="{FF2B5EF4-FFF2-40B4-BE49-F238E27FC236}">
+                <a16:creationId xmlns:a16="http://schemas.microsoft.com/office/drawing/2014/main" id="{103D88BF-51AE-46F2-8081-A3C506432709}"/>
+              </a:ext>
+            </a:extLst>
+          </p:cNvPr>
+          <p:cNvPicPr>
+            <a:picLocks noGrp="1" noChangeAspect="1"/>
+          </p:cNvPicPr>
+          <p:nvPr>
+            <p:ph type="pic" idx="1"/>
+          </p:nvPr>
+        </p:nvPicPr>
+        <p:blipFill>
+          <a:blip r:embed="rId2" cstate="email">
+            <a:extLst>
+              <a:ext uri="{28A0092B-C50C-407E-A947-70E740481C1C}">
+                <a14:useLocalDpi xmlns:a14="http://schemas.microsoft.com/office/drawing/2010/main"/>
+              </a:ext>
+            </a:extLst>
+          </a:blip>
+          <a:srcRect/>
+          <a:stretch>
+            <a:fillRect/>
+          </a:stretch>
+        </p:blipFill>
+        <p:spPr>
+          <a:xfrm>
+            <a:off x="1141411" y="783406"/>
+            <a:ext cx="9912354" cy="3299778"/>
+          </a:xfrm>
+        </p:spPr>
+      </p:pic>
+      <p:sp>
+        <p:nvSpPr>
+          <p:cNvPr id="4" name="Text Placeholder 3">
+            <a:extLst>
+              <a:ext uri="{FF2B5EF4-FFF2-40B4-BE49-F238E27FC236}">
+                <a16:creationId xmlns:a16="http://schemas.microsoft.com/office/drawing/2014/main" id="{41A79215-653F-4996-95E5-0FD4B247B21F}"/>
+              </a:ext>
+            </a:extLst>
+          </p:cNvPr>
+          <p:cNvSpPr>
+            <a:spLocks noGrp="1"/>
+          </p:cNvSpPr>
+          <p:nvPr>
+            <p:ph type="body" sz="half" idx="2"/>
+          </p:nvPr>
+        </p:nvSpPr>
+        <p:spPr>
+          <a:xfrm>
+            <a:off x="1141364" y="5124019"/>
+            <a:ext cx="9910859" cy="1325941"/>
+          </a:xfrm>
+        </p:spPr>
+        <p:txBody>
+          <a:bodyPr>
+            <a:normAutofit/>
+          </a:bodyPr>
+          <a:lstStyle/>
+          <a:p>
+            <a:pPr algn="ctr"/>
+            <a:r>
+              <a:rPr lang="en-US" sz="2400" dirty="0">
+                <a:hlinkClick r:id="rId3"/>
+              </a:rPr>
+              <a:t>someone@example.com</a:t>
+            </a:r>
+            <a:endParaRPr lang="en-US" sz="2400" dirty="0"/>
+          </a:p>
+        </p:txBody>
+      </p:sp>
+    </p:spTree>
+    <p:extLst>
+      <p:ext uri="{BB962C8B-B14F-4D97-AF65-F5344CB8AC3E}">
+        <p14:creationId xmlns:p14="http://schemas.microsoft.com/office/powerpoint/2010/main" val="3906540354"/>
+      </p:ext>
+    </p:extLst>
+  </p:cSld>
+  <p:clrMapOvr>
+    <a:masterClrMapping/>
+  </p:clrMapOvr>
+</p:sld>
+</file>
+
 <file path=ppt/slides/slide2.xml><?xml version="1.0" encoding="utf-8"?>
 <p:sld xmlns:a="http://schemas.openxmlformats.org/drawingml/2006/main" xmlns:r="http://schemas.openxmlformats.org/officeDocument/2006/relationships" xmlns:p="http://schemas.openxmlformats.org/presentationml/2006/main">
   <p:cSld>
@@ -16034,56 +16176,35 @@
           </a:p>
         </p:txBody>
       </p:sp>
-      <p:sp>
-        <p:nvSpPr>
-          <p:cNvPr id="3" name="Content Placeholder 2">
+      <p:pic>
+        <p:nvPicPr>
+          <p:cNvPr id="6" name="Content Placeholder 5">
             <a:extLst>
               <a:ext uri="{FF2B5EF4-FFF2-40B4-BE49-F238E27FC236}">
-                <a16:creationId xmlns:a16="http://schemas.microsoft.com/office/drawing/2014/main" id="{E45CC085-5837-486C-927A-FC9885D2B4D3}"/>
+                <a16:creationId xmlns:a16="http://schemas.microsoft.com/office/drawing/2014/main" id="{45055A49-7EAD-45A8-AEF6-2D12A411F965}"/>
               </a:ext>
             </a:extLst>
           </p:cNvPr>
-          <p:cNvSpPr>
-            <a:spLocks noGrp="1"/>
-          </p:cNvSpPr>
+          <p:cNvPicPr>
+            <a:picLocks noGrp="1" noChangeAspect="1"/>
+          </p:cNvPicPr>
           <p:nvPr>
             <p:ph sz="half" idx="1"/>
           </p:nvPr>
-        </p:nvSpPr>
-        <p:spPr/>
-        <p:txBody>
-          <a:bodyPr/>
-          <a:lstStyle/>
-          <a:p>
-            <a:endParaRPr lang="it-IT"/>
-          </a:p>
-        </p:txBody>
-      </p:sp>
-      <p:sp>
-        <p:nvSpPr>
-          <p:cNvPr id="4" name="Content Placeholder 3">
-            <a:extLst>
-              <a:ext uri="{FF2B5EF4-FFF2-40B4-BE49-F238E27FC236}">
-                <a16:creationId xmlns:a16="http://schemas.microsoft.com/office/drawing/2014/main" id="{489A89CB-7412-4152-9DDE-1CA8E35A3D49}"/>
-              </a:ext>
-            </a:extLst>
-          </p:cNvPr>
-          <p:cNvSpPr>
-            <a:spLocks noGrp="1"/>
-          </p:cNvSpPr>
-          <p:nvPr>
-            <p:ph sz="half" idx="2"/>
-          </p:nvPr>
-        </p:nvSpPr>
-        <p:spPr/>
-        <p:txBody>
-          <a:bodyPr/>
-          <a:lstStyle/>
-          <a:p>
-            <a:endParaRPr lang="it-IT"/>
-          </a:p>
-        </p:txBody>
-      </p:sp>
+        </p:nvPicPr>
+        <p:blipFill>
+          <a:blip r:embed="rId2"/>
+          <a:stretch>
+            <a:fillRect/>
+          </a:stretch>
+        </p:blipFill>
+        <p:spPr>
+          <a:xfrm>
+            <a:off x="1040745" y="2249485"/>
+            <a:ext cx="10224649" cy="3010411"/>
+          </a:xfrm>
+        </p:spPr>
+      </p:pic>
     </p:spTree>
     <p:extLst>
       <p:ext uri="{BB962C8B-B14F-4D97-AF65-F5344CB8AC3E}">
@@ -16119,7 +16240,7 @@
           <p:cNvPr id="2" name="Title 1">
             <a:extLst>
               <a:ext uri="{FF2B5EF4-FFF2-40B4-BE49-F238E27FC236}">
-                <a16:creationId xmlns:a16="http://schemas.microsoft.com/office/drawing/2014/main" id="{7ADC9467-D86A-4D44-9E01-5796E5BDA396}"/>
+                <a16:creationId xmlns:a16="http://schemas.microsoft.com/office/drawing/2014/main" id="{8198E838-69D3-47AD-A56A-0C1EE80E06A4}"/>
               </a:ext>
             </a:extLst>
           </p:cNvPr>
@@ -16132,59 +16253,35 @@
         </p:nvSpPr>
         <p:spPr/>
         <p:txBody>
-          <a:bodyPr anchor="ctr"/>
+          <a:bodyPr/>
           <a:lstStyle/>
           <a:p>
-            <a:pPr algn="ctr"/>
-            <a:r>
-              <a:rPr lang="en-US" dirty="0"/>
-              <a:t>  Contact details	</a:t>
-            </a:r>
+            <a:r>
+              <a:rPr lang="it-IT" dirty="0"/>
+              <a:t>Simple </a:t>
+            </a:r>
+            <a:r>
+              <a:rPr lang="it-IT" dirty="0" err="1"/>
+              <a:t>wait</a:t>
+            </a:r>
+            <a:r>
+              <a:rPr lang="it-IT" dirty="0"/>
+              <a:t> </a:t>
+            </a:r>
+            <a:r>
+              <a:rPr lang="it-IT" dirty="0" err="1"/>
+              <a:t>lib</a:t>
+            </a:r>
+            <a:endParaRPr lang="it-IT" dirty="0"/>
           </a:p>
         </p:txBody>
       </p:sp>
-      <p:pic>
-        <p:nvPicPr>
-          <p:cNvPr id="6" name="Picture Placeholder 5" descr="Circuit">
+      <p:sp>
+        <p:nvSpPr>
+          <p:cNvPr id="3" name="Content Placeholder 2">
             <a:extLst>
               <a:ext uri="{FF2B5EF4-FFF2-40B4-BE49-F238E27FC236}">
-                <a16:creationId xmlns:a16="http://schemas.microsoft.com/office/drawing/2014/main" id="{103D88BF-51AE-46F2-8081-A3C506432709}"/>
-              </a:ext>
-            </a:extLst>
-          </p:cNvPr>
-          <p:cNvPicPr>
-            <a:picLocks noGrp="1" noChangeAspect="1"/>
-          </p:cNvPicPr>
-          <p:nvPr>
-            <p:ph type="pic" idx="1"/>
-          </p:nvPr>
-        </p:nvPicPr>
-        <p:blipFill>
-          <a:blip r:embed="rId2" cstate="email">
-            <a:extLst>
-              <a:ext uri="{28A0092B-C50C-407E-A947-70E740481C1C}">
-                <a14:useLocalDpi xmlns:a14="http://schemas.microsoft.com/office/drawing/2010/main"/>
-              </a:ext>
-            </a:extLst>
-          </a:blip>
-          <a:srcRect/>
-          <a:stretch>
-            <a:fillRect/>
-          </a:stretch>
-        </p:blipFill>
-        <p:spPr>
-          <a:xfrm>
-            <a:off x="1141411" y="783406"/>
-            <a:ext cx="9912354" cy="3299778"/>
-          </a:xfrm>
-        </p:spPr>
-      </p:pic>
-      <p:sp>
-        <p:nvSpPr>
-          <p:cNvPr id="4" name="Text Placeholder 3">
-            <a:extLst>
-              <a:ext uri="{FF2B5EF4-FFF2-40B4-BE49-F238E27FC236}">
-                <a16:creationId xmlns:a16="http://schemas.microsoft.com/office/drawing/2014/main" id="{41A79215-653F-4996-95E5-0FD4B247B21F}"/>
+                <a16:creationId xmlns:a16="http://schemas.microsoft.com/office/drawing/2014/main" id="{5D25BF08-890A-4D9E-A70A-2B976F0ED06D}"/>
               </a:ext>
             </a:extLst>
           </p:cNvPr>
@@ -16192,36 +16289,168 @@
             <a:spLocks noGrp="1"/>
           </p:cNvSpPr>
           <p:nvPr>
-            <p:ph type="body" sz="half" idx="2"/>
+            <p:ph sz="half" idx="1"/>
           </p:nvPr>
         </p:nvSpPr>
         <p:spPr>
           <a:xfrm>
-            <a:off x="1141364" y="5124019"/>
-            <a:ext cx="9910859" cy="1325941"/>
+            <a:off x="1141412" y="2249486"/>
+            <a:ext cx="9990779" cy="3541714"/>
           </a:xfrm>
         </p:spPr>
         <p:txBody>
-          <a:bodyPr>
-            <a:normAutofit/>
-          </a:bodyPr>
+          <a:bodyPr/>
           <a:lstStyle/>
           <a:p>
-            <a:pPr algn="ctr"/>
-            <a:r>
-              <a:rPr lang="en-US" sz="2400" dirty="0">
-                <a:hlinkClick r:id="rId3"/>
-              </a:rPr>
-              <a:t>someone@example.com</a:t>
-            </a:r>
-            <a:endParaRPr lang="en-US" sz="2400" dirty="0"/>
+            <a:r>
+              <a:rPr lang="it-IT" dirty="0"/>
+              <a:t>Implementa i metodi dei blocchetti arancioni del Lego Mindstorms</a:t>
+            </a:r>
+          </a:p>
+          <a:p>
+            <a:r>
+              <a:rPr lang="it-IT" dirty="0"/>
+              <a:t>Contiene vari metodi che fanno una determinata azione mentre aspettano che ne succede un’altra</a:t>
+            </a:r>
+          </a:p>
+          <a:p>
+            <a:endParaRPr lang="it-IT" dirty="0"/>
           </a:p>
         </p:txBody>
       </p:sp>
     </p:spTree>
     <p:extLst>
       <p:ext uri="{BB962C8B-B14F-4D97-AF65-F5344CB8AC3E}">
-        <p14:creationId xmlns:p14="http://schemas.microsoft.com/office/powerpoint/2010/main" val="3906540354"/>
+        <p14:creationId xmlns:p14="http://schemas.microsoft.com/office/powerpoint/2010/main" val="2840415419"/>
+      </p:ext>
+    </p:extLst>
+  </p:cSld>
+  <p:clrMapOvr>
+    <a:masterClrMapping/>
+  </p:clrMapOvr>
+</p:sld>
+</file>
+
+<file path=ppt/slides/slide9.xml><?xml version="1.0" encoding="utf-8"?>
+<p:sld xmlns:a="http://schemas.openxmlformats.org/drawingml/2006/main" xmlns:r="http://schemas.openxmlformats.org/officeDocument/2006/relationships" xmlns:p="http://schemas.openxmlformats.org/presentationml/2006/main">
+  <p:cSld>
+    <p:spTree>
+      <p:nvGrpSpPr>
+        <p:cNvPr id="1" name=""/>
+        <p:cNvGrpSpPr/>
+        <p:nvPr/>
+      </p:nvGrpSpPr>
+      <p:grpSpPr>
+        <a:xfrm>
+          <a:off x="0" y="0"/>
+          <a:ext cx="0" cy="0"/>
+          <a:chOff x="0" y="0"/>
+          <a:chExt cx="0" cy="0"/>
+        </a:xfrm>
+      </p:grpSpPr>
+      <p:sp>
+        <p:nvSpPr>
+          <p:cNvPr id="2" name="Title 1">
+            <a:extLst>
+              <a:ext uri="{FF2B5EF4-FFF2-40B4-BE49-F238E27FC236}">
+                <a16:creationId xmlns:a16="http://schemas.microsoft.com/office/drawing/2014/main" id="{7380E511-4BB0-4304-B440-AA9D087307AB}"/>
+              </a:ext>
+            </a:extLst>
+          </p:cNvPr>
+          <p:cNvSpPr>
+            <a:spLocks noGrp="1"/>
+          </p:cNvSpPr>
+          <p:nvPr>
+            <p:ph type="title"/>
+          </p:nvPr>
+        </p:nvSpPr>
+        <p:spPr/>
+        <p:txBody>
+          <a:bodyPr/>
+          <a:lstStyle/>
+          <a:p>
+            <a:r>
+              <a:rPr lang="it-IT" dirty="0"/>
+              <a:t>Simple </a:t>
+            </a:r>
+            <a:r>
+              <a:rPr lang="it-IT" dirty="0" err="1"/>
+              <a:t>motor</a:t>
+            </a:r>
+            <a:r>
+              <a:rPr lang="it-IT" dirty="0"/>
+              <a:t> </a:t>
+            </a:r>
+            <a:r>
+              <a:rPr lang="it-IT" dirty="0" err="1"/>
+              <a:t>lib</a:t>
+            </a:r>
+            <a:endParaRPr lang="it-IT" dirty="0"/>
+          </a:p>
+        </p:txBody>
+      </p:sp>
+      <p:sp>
+        <p:nvSpPr>
+          <p:cNvPr id="3" name="Content Placeholder 2">
+            <a:extLst>
+              <a:ext uri="{FF2B5EF4-FFF2-40B4-BE49-F238E27FC236}">
+                <a16:creationId xmlns:a16="http://schemas.microsoft.com/office/drawing/2014/main" id="{039C4DA1-E166-4E75-A4C9-C6C4C96A4B0D}"/>
+              </a:ext>
+            </a:extLst>
+          </p:cNvPr>
+          <p:cNvSpPr>
+            <a:spLocks noGrp="1"/>
+          </p:cNvSpPr>
+          <p:nvPr>
+            <p:ph sz="half" idx="1"/>
+          </p:nvPr>
+        </p:nvSpPr>
+        <p:spPr>
+          <a:xfrm>
+            <a:off x="1141410" y="2249486"/>
+            <a:ext cx="10250840" cy="3541714"/>
+          </a:xfrm>
+        </p:spPr>
+        <p:txBody>
+          <a:bodyPr/>
+          <a:lstStyle/>
+          <a:p>
+            <a:r>
+              <a:rPr lang="it-IT" dirty="0"/>
+              <a:t>Implementa metodi utili per l’utilizzo dei motori</a:t>
+            </a:r>
+          </a:p>
+          <a:p>
+            <a:r>
+              <a:rPr lang="it-IT" dirty="0"/>
+              <a:t>È indipendente dalla Simple </a:t>
+            </a:r>
+            <a:r>
+              <a:rPr lang="it-IT" dirty="0" err="1"/>
+              <a:t>Wait</a:t>
+            </a:r>
+            <a:r>
+              <a:rPr lang="it-IT" dirty="0"/>
+              <a:t> </a:t>
+            </a:r>
+            <a:r>
+              <a:rPr lang="it-IT" dirty="0" err="1"/>
+              <a:t>Lib</a:t>
+            </a:r>
+            <a:endParaRPr lang="it-IT" dirty="0"/>
+          </a:p>
+          <a:p>
+            <a:endParaRPr lang="it-IT" dirty="0"/>
+          </a:p>
+          <a:p>
+            <a:endParaRPr lang="it-IT" dirty="0"/>
+          </a:p>
+        </p:txBody>
+      </p:sp>
+    </p:spTree>
+    <p:extLst>
+      <p:ext uri="{BB962C8B-B14F-4D97-AF65-F5344CB8AC3E}">
+        <p14:creationId xmlns:p14="http://schemas.microsoft.com/office/powerpoint/2010/main" val="303496920"/>
       </p:ext>
     </p:extLst>
   </p:cSld>
@@ -16778,6 +17007,23 @@
 </file>
 
 <file path=customXml/item1.xml><?xml version="1.0" encoding="utf-8"?>
+<p:properties xmlns:p="http://schemas.microsoft.com/office/2006/metadata/properties" xmlns:xsi="http://www.w3.org/2001/XMLSchema-instance" xmlns:pc="http://schemas.microsoft.com/office/infopath/2007/PartnerControls">
+  <documentManagement>
+    <MediaServiceKeyPoints xmlns="71af3243-3dd4-4a8d-8c0d-dd76da1f02a5" xsi:nil="true"/>
+  </documentManagement>
+</p:properties>
+</file>
+
+<file path=customXml/item2.xml><?xml version="1.0" encoding="utf-8"?>
+<?mso-contentType ?>
+<FormTemplates xmlns="http://schemas.microsoft.com/sharepoint/v3/contenttype/forms">
+  <Display>DocumentLibraryForm</Display>
+  <Edit>DocumentLibraryForm</Edit>
+  <New>DocumentLibraryForm</New>
+</FormTemplates>
+</file>
+
+<file path=customXml/item3.xml><?xml version="1.0" encoding="utf-8"?>
 <ct:contentTypeSchema xmlns:ct="http://schemas.microsoft.com/office/2006/metadata/contentType" xmlns:ma="http://schemas.microsoft.com/office/2006/metadata/properties/metaAttributes" ct:_="" ma:_="" ma:contentTypeName="Document" ma:contentTypeID="0x01010079F111ED35F8CC479449609E8A0923A6" ma:contentTypeVersion="11" ma:contentTypeDescription="Create a new document." ma:contentTypeScope="" ma:versionID="1c2eb7a32e66fb6e4260f3771546a5e2">
   <xsd:schema xmlns:xsd="http://www.w3.org/2001/XMLSchema" xmlns:xs="http://www.w3.org/2001/XMLSchema" xmlns:p="http://schemas.microsoft.com/office/2006/metadata/properties" xmlns:ns2="71af3243-3dd4-4a8d-8c0d-dd76da1f02a5" xmlns:ns3="16c05727-aa75-4e4a-9b5f-8a80a1165891" targetNamespace="http://schemas.microsoft.com/office/2006/metadata/properties" ma:root="true" ma:fieldsID="04e1f6479c48b08974ba73b5ca973489" ns2:_="" ns3:_="">
     <xsd:import namespace="71af3243-3dd4-4a8d-8c0d-dd76da1f02a5"/>
@@ -16988,24 +17234,25 @@
 </ct:contentTypeSchema>
 </file>
 
-<file path=customXml/item2.xml><?xml version="1.0" encoding="utf-8"?>
-<?mso-contentType ?>
-<FormTemplates xmlns="http://schemas.microsoft.com/sharepoint/v3/contenttype/forms">
-  <Display>DocumentLibraryForm</Display>
-  <Edit>DocumentLibraryForm</Edit>
-  <New>DocumentLibraryForm</New>
-</FormTemplates>
+<file path=customXml/itemProps1.xml><?xml version="1.0" encoding="utf-8"?>
+<ds:datastoreItem xmlns:ds="http://schemas.openxmlformats.org/officeDocument/2006/customXml" ds:itemID="{83E9F5BB-97DB-4160-B47A-8FCEBC4F46E5}">
+  <ds:schemaRefs>
+    <ds:schemaRef ds:uri="http://schemas.microsoft.com/office/2006/metadata/properties"/>
+    <ds:schemaRef ds:uri="http://schemas.microsoft.com/office/infopath/2007/PartnerControls"/>
+    <ds:schemaRef ds:uri="71af3243-3dd4-4a8d-8c0d-dd76da1f02a5"/>
+  </ds:schemaRefs>
+</ds:datastoreItem>
 </file>
 
-<file path=customXml/item3.xml><?xml version="1.0" encoding="utf-8"?>
-<p:properties xmlns:p="http://schemas.microsoft.com/office/2006/metadata/properties" xmlns:xsi="http://www.w3.org/2001/XMLSchema-instance" xmlns:pc="http://schemas.microsoft.com/office/infopath/2007/PartnerControls">
-  <documentManagement>
-    <MediaServiceKeyPoints xmlns="71af3243-3dd4-4a8d-8c0d-dd76da1f02a5" xsi:nil="true"/>
-  </documentManagement>
-</p:properties>
+<file path=customXml/itemProps2.xml><?xml version="1.0" encoding="utf-8"?>
+<ds:datastoreItem xmlns:ds="http://schemas.openxmlformats.org/officeDocument/2006/customXml" ds:itemID="{3545AAC2-3D9B-47D1-B22C-F3D1B3D4DEA8}">
+  <ds:schemaRefs>
+    <ds:schemaRef ds:uri="http://schemas.microsoft.com/sharepoint/v3/contenttype/forms"/>
+  </ds:schemaRefs>
+</ds:datastoreItem>
 </file>
 
-<file path=customXml/itemProps1.xml><?xml version="1.0" encoding="utf-8"?>
+<file path=customXml/itemProps3.xml><?xml version="1.0" encoding="utf-8"?>
 <ds:datastoreItem xmlns:ds="http://schemas.openxmlformats.org/officeDocument/2006/customXml" ds:itemID="{D35D4F14-B0CC-4BD5-A6F5-6EB7AE97AF0B}">
   <ds:schemaRefs>
     <ds:schemaRef ds:uri="http://schemas.microsoft.com/office/2006/metadata/contentType"/>
@@ -17022,22 +17269,4 @@
     <ds:schemaRef ds:uri="http://schemas.microsoft.com/internal/obd"/>
   </ds:schemaRefs>
 </ds:datastoreItem>
-</file>
-
-<file path=customXml/itemProps2.xml><?xml version="1.0" encoding="utf-8"?>
-<ds:datastoreItem xmlns:ds="http://schemas.openxmlformats.org/officeDocument/2006/customXml" ds:itemID="{3545AAC2-3D9B-47D1-B22C-F3D1B3D4DEA8}">
-  <ds:schemaRefs>
-    <ds:schemaRef ds:uri="http://schemas.microsoft.com/sharepoint/v3/contenttype/forms"/>
-  </ds:schemaRefs>
-</ds:datastoreItem>
-</file>
-
-<file path=customXml/itemProps3.xml><?xml version="1.0" encoding="utf-8"?>
-<ds:datastoreItem xmlns:ds="http://schemas.openxmlformats.org/officeDocument/2006/customXml" ds:itemID="{83E9F5BB-97DB-4160-B47A-8FCEBC4F46E5}">
-  <ds:schemaRefs>
-    <ds:schemaRef ds:uri="http://schemas.microsoft.com/office/2006/metadata/properties"/>
-    <ds:schemaRef ds:uri="http://schemas.microsoft.com/office/infopath/2007/PartnerControls"/>
-    <ds:schemaRef ds:uri="71af3243-3dd4-4a8d-8c0d-dd76da1f02a5"/>
-  </ds:schemaRefs>
-</ds:datastoreItem>
 </file>
</xml_diff>

<commit_message>
fix UML delle classi
</commit_message>
<xml_diff>
--- a/Documentazione/Presentazione/Presentazione.pptx
+++ b/Documentazione/Presentazione/Presentazione.pptx
@@ -5,7 +5,7 @@
     <p:sldMasterId id="2147483669" r:id="rId4"/>
   </p:sldMasterIdLst>
   <p:notesMasterIdLst>
-    <p:notesMasterId r:id="rId15"/>
+    <p:notesMasterId r:id="rId17"/>
   </p:notesMasterIdLst>
   <p:sldIdLst>
     <p:sldId id="256" r:id="rId5"/>
@@ -17,7 +17,9 @@
     <p:sldId id="267" r:id="rId11"/>
     <p:sldId id="268" r:id="rId12"/>
     <p:sldId id="269" r:id="rId13"/>
-    <p:sldId id="260" r:id="rId14"/>
+    <p:sldId id="270" r:id="rId14"/>
+    <p:sldId id="271" r:id="rId15"/>
+    <p:sldId id="260" r:id="rId16"/>
   </p:sldIdLst>
   <p:sldSz cx="12192000" cy="6858000"/>
   <p:notesSz cx="6858000" cy="9144000"/>
@@ -142,6 +144,16 @@
           <p14:sldIdLst>
             <p14:sldId id="268"/>
             <p14:sldId id="269"/>
+          </p14:sldIdLst>
+        </p14:section>
+        <p14:section name="Explorer" id="{D0763F5B-94C9-4708-A57F-01574C6E3CEC}">
+          <p14:sldIdLst>
+            <p14:sldId id="270"/>
+          </p14:sldIdLst>
+        </p14:section>
+        <p14:section name="Conclusione" id="{199FD634-BAE5-4C4C-B88C-AD4EC2FD5AE2}">
+          <p14:sldIdLst>
+            <p14:sldId id="271"/>
             <p14:sldId id="260"/>
           </p14:sldIdLst>
         </p14:section>
@@ -236,7 +248,7 @@
           <a:p>
             <a:fld id="{1EDC063C-7640-4A26-BDD8-232605362384}" type="datetimeFigureOut">
               <a:rPr lang="it-IT" smtClean="0"/>
-              <a:t>06/02/2019</a:t>
+              <a:t>08/02/2019</a:t>
             </a:fld>
             <a:endParaRPr lang="it-IT"/>
           </a:p>
@@ -504,6 +516,101 @@
 </p:notesMaster>
 </file>
 
+<file path=ppt/notesSlides/notesSlide1.xml><?xml version="1.0" encoding="utf-8"?>
+<p:notes xmlns:a="http://schemas.openxmlformats.org/drawingml/2006/main" xmlns:r="http://schemas.openxmlformats.org/officeDocument/2006/relationships" xmlns:p="http://schemas.openxmlformats.org/presentationml/2006/main">
+  <p:cSld>
+    <p:spTree>
+      <p:nvGrpSpPr>
+        <p:cNvPr id="1" name=""/>
+        <p:cNvGrpSpPr/>
+        <p:nvPr/>
+      </p:nvGrpSpPr>
+      <p:grpSpPr>
+        <a:xfrm>
+          <a:off x="0" y="0"/>
+          <a:ext cx="0" cy="0"/>
+          <a:chOff x="0" y="0"/>
+          <a:chExt cx="0" cy="0"/>
+        </a:xfrm>
+      </p:grpSpPr>
+      <p:sp>
+        <p:nvSpPr>
+          <p:cNvPr id="2" name="Slide Image Placeholder 1"/>
+          <p:cNvSpPr>
+            <a:spLocks noGrp="1" noRot="1" noChangeAspect="1"/>
+          </p:cNvSpPr>
+          <p:nvPr>
+            <p:ph type="sldImg"/>
+          </p:nvPr>
+        </p:nvSpPr>
+        <p:spPr/>
+      </p:sp>
+      <p:sp>
+        <p:nvSpPr>
+          <p:cNvPr id="3" name="Notes Placeholder 2"/>
+          <p:cNvSpPr>
+            <a:spLocks noGrp="1"/>
+          </p:cNvSpPr>
+          <p:nvPr>
+            <p:ph type="body" idx="1"/>
+          </p:nvPr>
+        </p:nvSpPr>
+        <p:spPr/>
+        <p:txBody>
+          <a:bodyPr/>
+          <a:lstStyle/>
+          <a:p>
+            <a:r>
+              <a:rPr lang="it-IT" sz="1200" b="0" kern="1200" dirty="0">
+                <a:solidFill>
+                  <a:schemeClr val="tx1"/>
+                </a:solidFill>
+                <a:effectLst/>
+                <a:latin typeface="+mn-lt"/>
+                <a:ea typeface="+mn-ea"/>
+                <a:cs typeface="+mn-cs"/>
+              </a:rPr>
+              <a:t>La nostra soluzione aiuterà in un modo significante le generazioni future di sviluppare programmi complessi in modo veloce e più intuitivo rispetto alla programmazione grafica. Riteniamo che aiuterà soprattutto i futuri partecipanti della First Lego League e della WRO. </a:t>
+            </a:r>
+          </a:p>
+        </p:txBody>
+      </p:sp>
+      <p:sp>
+        <p:nvSpPr>
+          <p:cNvPr id="4" name="Slide Number Placeholder 3"/>
+          <p:cNvSpPr>
+            <a:spLocks noGrp="1"/>
+          </p:cNvSpPr>
+          <p:nvPr>
+            <p:ph type="sldNum" sz="quarter" idx="5"/>
+          </p:nvPr>
+        </p:nvSpPr>
+        <p:spPr/>
+        <p:txBody>
+          <a:bodyPr/>
+          <a:lstStyle/>
+          <a:p>
+            <a:fld id="{AE39909D-BC76-4AF6-9F64-28D7AB358EAC}" type="slidenum">
+              <a:rPr lang="it-IT" smtClean="0"/>
+              <a:t>11</a:t>
+            </a:fld>
+            <a:endParaRPr lang="it-IT"/>
+          </a:p>
+        </p:txBody>
+      </p:sp>
+    </p:spTree>
+    <p:extLst>
+      <p:ext uri="{BB962C8B-B14F-4D97-AF65-F5344CB8AC3E}">
+        <p14:creationId xmlns:p14="http://schemas.microsoft.com/office/powerpoint/2010/main" val="3473577808"/>
+      </p:ext>
+    </p:extLst>
+  </p:cSld>
+  <p:clrMapOvr>
+    <a:masterClrMapping/>
+  </p:clrMapOvr>
+</p:notes>
+</file>
+
 <file path=ppt/slideLayouts/slideLayout1.xml><?xml version="1.0" encoding="utf-8"?>
 <p:sldLayout xmlns:a="http://schemas.openxmlformats.org/drawingml/2006/main" xmlns:r="http://schemas.openxmlformats.org/officeDocument/2006/relationships" xmlns:p="http://schemas.openxmlformats.org/presentationml/2006/main" showMasterSp="0" type="title" preserve="1">
   <p:cSld name="Title Slide">
@@ -561,7 +668,7 @@
           <a:noFill/>
           <a:extLst>
             <a:ext uri="{909E8E84-426E-40dd-AFC4-6F175D3DCCD1}">
-              <a14:hiddenFill xmlns="" xmlns:a14="http://schemas.microsoft.com/office/drawing/2010/main">
+              <a14:hiddenFill xmlns:a14="http://schemas.microsoft.com/office/drawing/2010/main" xmlns="">
                 <a:solidFill>
                   <a:srgbClr val="FFFFFF"/>
                 </a:solidFill>
@@ -620,7 +727,7 @@
             </a:ln>
             <a:extLst>
               <a:ext uri="{91240B29-F687-4f45-9708-019B960494DF}">
-                <a14:hiddenLine xmlns="" xmlns:a14="http://schemas.microsoft.com/office/drawing/2010/main" w="9525">
+                <a14:hiddenLine xmlns:a14="http://schemas.microsoft.com/office/drawing/2010/main" xmlns="" w="9525">
                   <a:solidFill>
                     <a:srgbClr val="000000"/>
                   </a:solidFill>
@@ -710,7 +817,7 @@
             </a:ln>
             <a:extLst>
               <a:ext uri="{91240B29-F687-4f45-9708-019B960494DF}">
-                <a14:hiddenLine xmlns="" xmlns:a14="http://schemas.microsoft.com/office/drawing/2010/main" w="9525">
+                <a14:hiddenLine xmlns:a14="http://schemas.microsoft.com/office/drawing/2010/main" xmlns="" w="9525">
                   <a:solidFill>
                     <a:srgbClr val="000000"/>
                   </a:solidFill>
@@ -800,7 +907,7 @@
             </a:ln>
             <a:extLst>
               <a:ext uri="{91240B29-F687-4f45-9708-019B960494DF}">
-                <a14:hiddenLine xmlns="" xmlns:a14="http://schemas.microsoft.com/office/drawing/2010/main" w="9525">
+                <a14:hiddenLine xmlns:a14="http://schemas.microsoft.com/office/drawing/2010/main" xmlns="" w="9525">
                   <a:solidFill>
                     <a:srgbClr val="000000"/>
                   </a:solidFill>
@@ -834,7 +941,7 @@
             </a:ln>
             <a:extLst>
               <a:ext uri="{91240B29-F687-4f45-9708-019B960494DF}">
-                <a14:hiddenLine xmlns="" xmlns:a14="http://schemas.microsoft.com/office/drawing/2010/main" w="9525">
+                <a14:hiddenLine xmlns:a14="http://schemas.microsoft.com/office/drawing/2010/main" xmlns="" w="9525">
                   <a:solidFill>
                     <a:srgbClr val="000000"/>
                   </a:solidFill>
@@ -924,7 +1031,7 @@
             </a:ln>
             <a:extLst>
               <a:ext uri="{91240B29-F687-4f45-9708-019B960494DF}">
-                <a14:hiddenLine xmlns="" xmlns:a14="http://schemas.microsoft.com/office/drawing/2010/main" w="9525">
+                <a14:hiddenLine xmlns:a14="http://schemas.microsoft.com/office/drawing/2010/main" xmlns="" w="9525">
                   <a:solidFill>
                     <a:srgbClr val="000000"/>
                   </a:solidFill>
@@ -986,7 +1093,7 @@
             </a:ln>
             <a:extLst>
               <a:ext uri="{91240B29-F687-4f45-9708-019B960494DF}">
-                <a14:hiddenLine xmlns="" xmlns:a14="http://schemas.microsoft.com/office/drawing/2010/main" w="9525">
+                <a14:hiddenLine xmlns:a14="http://schemas.microsoft.com/office/drawing/2010/main" xmlns="" w="9525">
                   <a:solidFill>
                     <a:srgbClr val="000000"/>
                   </a:solidFill>
@@ -1048,7 +1155,7 @@
             </a:ln>
             <a:extLst>
               <a:ext uri="{91240B29-F687-4f45-9708-019B960494DF}">
-                <a14:hiddenLine xmlns="" xmlns:a14="http://schemas.microsoft.com/office/drawing/2010/main" w="9525">
+                <a14:hiddenLine xmlns:a14="http://schemas.microsoft.com/office/drawing/2010/main" xmlns="" w="9525">
                   <a:solidFill>
                     <a:srgbClr val="000000"/>
                   </a:solidFill>
@@ -1138,7 +1245,7 @@
             </a:ln>
             <a:extLst>
               <a:ext uri="{91240B29-F687-4f45-9708-019B960494DF}">
-                <a14:hiddenLine xmlns="" xmlns:a14="http://schemas.microsoft.com/office/drawing/2010/main" w="9525">
+                <a14:hiddenLine xmlns:a14="http://schemas.microsoft.com/office/drawing/2010/main" xmlns="" w="9525">
                   <a:solidFill>
                     <a:srgbClr val="000000"/>
                   </a:solidFill>
@@ -1200,7 +1307,7 @@
             </a:ln>
             <a:extLst>
               <a:ext uri="{91240B29-F687-4f45-9708-019B960494DF}">
-                <a14:hiddenLine xmlns="" xmlns:a14="http://schemas.microsoft.com/office/drawing/2010/main" w="9525">
+                <a14:hiddenLine xmlns:a14="http://schemas.microsoft.com/office/drawing/2010/main" xmlns="" w="9525">
                   <a:solidFill>
                     <a:srgbClr val="000000"/>
                   </a:solidFill>
@@ -1262,7 +1369,7 @@
             </a:ln>
             <a:extLst>
               <a:ext uri="{91240B29-F687-4f45-9708-019B960494DF}">
-                <a14:hiddenLine xmlns="" xmlns:a14="http://schemas.microsoft.com/office/drawing/2010/main" w="9525">
+                <a14:hiddenLine xmlns:a14="http://schemas.microsoft.com/office/drawing/2010/main" xmlns="" w="9525">
                   <a:solidFill>
                     <a:srgbClr val="000000"/>
                   </a:solidFill>
@@ -1352,7 +1459,7 @@
             </a:ln>
             <a:extLst>
               <a:ext uri="{91240B29-F687-4f45-9708-019B960494DF}">
-                <a14:hiddenLine xmlns="" xmlns:a14="http://schemas.microsoft.com/office/drawing/2010/main" w="9525">
+                <a14:hiddenLine xmlns:a14="http://schemas.microsoft.com/office/drawing/2010/main" xmlns="" w="9525">
                   <a:solidFill>
                     <a:srgbClr val="000000"/>
                   </a:solidFill>
@@ -1442,7 +1549,7 @@
             </a:ln>
             <a:extLst>
               <a:ext uri="{91240B29-F687-4f45-9708-019B960494DF}">
-                <a14:hiddenLine xmlns="" xmlns:a14="http://schemas.microsoft.com/office/drawing/2010/main" w="9525">
+                <a14:hiddenLine xmlns:a14="http://schemas.microsoft.com/office/drawing/2010/main" xmlns="" w="9525">
                   <a:solidFill>
                     <a:srgbClr val="000000"/>
                   </a:solidFill>
@@ -1504,7 +1611,7 @@
             </a:ln>
             <a:extLst>
               <a:ext uri="{91240B29-F687-4f45-9708-019B960494DF}">
-                <a14:hiddenLine xmlns="" xmlns:a14="http://schemas.microsoft.com/office/drawing/2010/main" w="9525">
+                <a14:hiddenLine xmlns:a14="http://schemas.microsoft.com/office/drawing/2010/main" xmlns="" w="9525">
                   <a:solidFill>
                     <a:srgbClr val="000000"/>
                   </a:solidFill>
@@ -1614,7 +1721,7 @@
             </a:ln>
             <a:extLst>
               <a:ext uri="{91240B29-F687-4f45-9708-019B960494DF}">
-                <a14:hiddenLine xmlns="" xmlns:a14="http://schemas.microsoft.com/office/drawing/2010/main" w="9525">
+                <a14:hiddenLine xmlns:a14="http://schemas.microsoft.com/office/drawing/2010/main" xmlns="" w="9525">
                   <a:solidFill>
                     <a:srgbClr val="000000"/>
                   </a:solidFill>
@@ -1676,7 +1783,7 @@
             </a:ln>
             <a:extLst>
               <a:ext uri="{91240B29-F687-4f45-9708-019B960494DF}">
-                <a14:hiddenLine xmlns="" xmlns:a14="http://schemas.microsoft.com/office/drawing/2010/main" w="9525">
+                <a14:hiddenLine xmlns:a14="http://schemas.microsoft.com/office/drawing/2010/main" xmlns="" w="9525">
                   <a:solidFill>
                     <a:srgbClr val="000000"/>
                   </a:solidFill>
@@ -1766,7 +1873,7 @@
             </a:ln>
             <a:extLst>
               <a:ext uri="{91240B29-F687-4f45-9708-019B960494DF}">
-                <a14:hiddenLine xmlns="" xmlns:a14="http://schemas.microsoft.com/office/drawing/2010/main" w="9525">
+                <a14:hiddenLine xmlns:a14="http://schemas.microsoft.com/office/drawing/2010/main" xmlns="" w="9525">
                   <a:solidFill>
                     <a:srgbClr val="000000"/>
                   </a:solidFill>
@@ -1856,7 +1963,7 @@
             </a:ln>
             <a:extLst>
               <a:ext uri="{91240B29-F687-4f45-9708-019B960494DF}">
-                <a14:hiddenLine xmlns="" xmlns:a14="http://schemas.microsoft.com/office/drawing/2010/main" w="9525">
+                <a14:hiddenLine xmlns:a14="http://schemas.microsoft.com/office/drawing/2010/main" xmlns="" w="9525">
                   <a:solidFill>
                     <a:srgbClr val="000000"/>
                   </a:solidFill>
@@ -1918,7 +2025,7 @@
             </a:ln>
             <a:extLst>
               <a:ext uri="{91240B29-F687-4f45-9708-019B960494DF}">
-                <a14:hiddenLine xmlns="" xmlns:a14="http://schemas.microsoft.com/office/drawing/2010/main" w="9525">
+                <a14:hiddenLine xmlns:a14="http://schemas.microsoft.com/office/drawing/2010/main" xmlns="" w="9525">
                   <a:solidFill>
                     <a:srgbClr val="000000"/>
                   </a:solidFill>
@@ -2008,7 +2115,7 @@
             </a:ln>
             <a:extLst>
               <a:ext uri="{91240B29-F687-4f45-9708-019B960494DF}">
-                <a14:hiddenLine xmlns="" xmlns:a14="http://schemas.microsoft.com/office/drawing/2010/main" w="9525">
+                <a14:hiddenLine xmlns:a14="http://schemas.microsoft.com/office/drawing/2010/main" xmlns="" w="9525">
                   <a:solidFill>
                     <a:srgbClr val="000000"/>
                   </a:solidFill>
@@ -2098,7 +2205,7 @@
             </a:ln>
             <a:extLst>
               <a:ext uri="{91240B29-F687-4f45-9708-019B960494DF}">
-                <a14:hiddenLine xmlns="" xmlns:a14="http://schemas.microsoft.com/office/drawing/2010/main" w="9525">
+                <a14:hiddenLine xmlns:a14="http://schemas.microsoft.com/office/drawing/2010/main" xmlns="" w="9525">
                   <a:solidFill>
                     <a:srgbClr val="000000"/>
                   </a:solidFill>
@@ -2154,7 +2261,7 @@
             </a:ln>
             <a:extLst>
               <a:ext uri="{91240B29-F687-4f45-9708-019B960494DF}">
-                <a14:hiddenLine xmlns="" xmlns:a14="http://schemas.microsoft.com/office/drawing/2010/main" w="9525">
+                <a14:hiddenLine xmlns:a14="http://schemas.microsoft.com/office/drawing/2010/main" xmlns="" w="9525">
                   <a:solidFill>
                     <a:srgbClr val="000000"/>
                   </a:solidFill>
@@ -2244,7 +2351,7 @@
             </a:ln>
             <a:extLst>
               <a:ext uri="{91240B29-F687-4f45-9708-019B960494DF}">
-                <a14:hiddenLine xmlns="" xmlns:a14="http://schemas.microsoft.com/office/drawing/2010/main" w="9525">
+                <a14:hiddenLine xmlns:a14="http://schemas.microsoft.com/office/drawing/2010/main" xmlns="" w="9525">
                   <a:solidFill>
                     <a:srgbClr val="000000"/>
                   </a:solidFill>
@@ -2300,7 +2407,7 @@
             </a:ln>
             <a:extLst>
               <a:ext uri="{91240B29-F687-4f45-9708-019B960494DF}">
-                <a14:hiddenLine xmlns="" xmlns:a14="http://schemas.microsoft.com/office/drawing/2010/main" w="9525">
+                <a14:hiddenLine xmlns:a14="http://schemas.microsoft.com/office/drawing/2010/main" xmlns="" w="9525">
                   <a:solidFill>
                     <a:srgbClr val="000000"/>
                   </a:solidFill>
@@ -2390,7 +2497,7 @@
             </a:ln>
             <a:extLst>
               <a:ext uri="{91240B29-F687-4f45-9708-019B960494DF}">
-                <a14:hiddenLine xmlns="" xmlns:a14="http://schemas.microsoft.com/office/drawing/2010/main" w="9525">
+                <a14:hiddenLine xmlns:a14="http://schemas.microsoft.com/office/drawing/2010/main" xmlns="" w="9525">
                   <a:solidFill>
                     <a:srgbClr val="000000"/>
                   </a:solidFill>
@@ -2458,7 +2565,7 @@
             </a:ln>
             <a:extLst>
               <a:ext uri="{91240B29-F687-4f45-9708-019B960494DF}">
-                <a14:hiddenLine xmlns="" xmlns:a14="http://schemas.microsoft.com/office/drawing/2010/main" w="9525">
+                <a14:hiddenLine xmlns:a14="http://schemas.microsoft.com/office/drawing/2010/main" xmlns="" w="9525">
                   <a:solidFill>
                     <a:srgbClr val="000000"/>
                   </a:solidFill>
@@ -2548,7 +2655,7 @@
             </a:ln>
             <a:extLst>
               <a:ext uri="{91240B29-F687-4f45-9708-019B960494DF}">
-                <a14:hiddenLine xmlns="" xmlns:a14="http://schemas.microsoft.com/office/drawing/2010/main" w="9525">
+                <a14:hiddenLine xmlns:a14="http://schemas.microsoft.com/office/drawing/2010/main" xmlns="" w="9525">
                   <a:solidFill>
                     <a:srgbClr val="000000"/>
                   </a:solidFill>
@@ -2616,7 +2723,7 @@
             </a:ln>
             <a:extLst>
               <a:ext uri="{91240B29-F687-4f45-9708-019B960494DF}">
-                <a14:hiddenLine xmlns="" xmlns:a14="http://schemas.microsoft.com/office/drawing/2010/main" w="9525">
+                <a14:hiddenLine xmlns:a14="http://schemas.microsoft.com/office/drawing/2010/main" xmlns="" w="9525">
                   <a:solidFill>
                     <a:srgbClr val="000000"/>
                   </a:solidFill>
@@ -2706,7 +2813,7 @@
             </a:ln>
             <a:extLst>
               <a:ext uri="{91240B29-F687-4f45-9708-019B960494DF}">
-                <a14:hiddenLine xmlns="" xmlns:a14="http://schemas.microsoft.com/office/drawing/2010/main" w="9525">
+                <a14:hiddenLine xmlns:a14="http://schemas.microsoft.com/office/drawing/2010/main" xmlns="" w="9525">
                   <a:solidFill>
                     <a:srgbClr val="000000"/>
                   </a:solidFill>
@@ -2740,7 +2847,7 @@
             </a:ln>
             <a:extLst>
               <a:ext uri="{91240B29-F687-4f45-9708-019B960494DF}">
-                <a14:hiddenLine xmlns="" xmlns:a14="http://schemas.microsoft.com/office/drawing/2010/main" w="9525">
+                <a14:hiddenLine xmlns:a14="http://schemas.microsoft.com/office/drawing/2010/main" xmlns="" w="9525">
                   <a:solidFill>
                     <a:srgbClr val="000000"/>
                   </a:solidFill>
@@ -2830,7 +2937,7 @@
             </a:ln>
             <a:extLst>
               <a:ext uri="{91240B29-F687-4f45-9708-019B960494DF}">
-                <a14:hiddenLine xmlns="" xmlns:a14="http://schemas.microsoft.com/office/drawing/2010/main" w="9525">
+                <a14:hiddenLine xmlns:a14="http://schemas.microsoft.com/office/drawing/2010/main" xmlns="" w="9525">
                   <a:solidFill>
                     <a:srgbClr val="000000"/>
                   </a:solidFill>
@@ -2892,7 +2999,7 @@
             </a:ln>
             <a:extLst>
               <a:ext uri="{91240B29-F687-4f45-9708-019B960494DF}">
-                <a14:hiddenLine xmlns="" xmlns:a14="http://schemas.microsoft.com/office/drawing/2010/main" w="9525">
+                <a14:hiddenLine xmlns:a14="http://schemas.microsoft.com/office/drawing/2010/main" xmlns="" w="9525">
                   <a:solidFill>
                     <a:srgbClr val="000000"/>
                   </a:solidFill>
@@ -2954,7 +3061,7 @@
             </a:ln>
             <a:extLst>
               <a:ext uri="{91240B29-F687-4f45-9708-019B960494DF}">
-                <a14:hiddenLine xmlns="" xmlns:a14="http://schemas.microsoft.com/office/drawing/2010/main" w="9525">
+                <a14:hiddenLine xmlns:a14="http://schemas.microsoft.com/office/drawing/2010/main" xmlns="" w="9525">
                   <a:solidFill>
                     <a:srgbClr val="000000"/>
                   </a:solidFill>
@@ -3044,7 +3151,7 @@
             </a:ln>
             <a:extLst>
               <a:ext uri="{91240B29-F687-4f45-9708-019B960494DF}">
-                <a14:hiddenLine xmlns="" xmlns:a14="http://schemas.microsoft.com/office/drawing/2010/main" w="9525">
+                <a14:hiddenLine xmlns:a14="http://schemas.microsoft.com/office/drawing/2010/main" xmlns="" w="9525">
                   <a:solidFill>
                     <a:srgbClr val="000000"/>
                   </a:solidFill>
@@ -3112,7 +3219,7 @@
             </a:ln>
             <a:extLst>
               <a:ext uri="{91240B29-F687-4f45-9708-019B960494DF}">
-                <a14:hiddenLine xmlns="" xmlns:a14="http://schemas.microsoft.com/office/drawing/2010/main" w="9525">
+                <a14:hiddenLine xmlns:a14="http://schemas.microsoft.com/office/drawing/2010/main" xmlns="" w="9525">
                   <a:solidFill>
                     <a:srgbClr val="000000"/>
                   </a:solidFill>
@@ -3174,7 +3281,7 @@
             </a:ln>
             <a:extLst>
               <a:ext uri="{91240B29-F687-4f45-9708-019B960494DF}">
-                <a14:hiddenLine xmlns="" xmlns:a14="http://schemas.microsoft.com/office/drawing/2010/main" w="9525">
+                <a14:hiddenLine xmlns:a14="http://schemas.microsoft.com/office/drawing/2010/main" xmlns="" w="9525">
                   <a:solidFill>
                     <a:srgbClr val="000000"/>
                   </a:solidFill>
@@ -3264,7 +3371,7 @@
             </a:ln>
             <a:extLst>
               <a:ext uri="{91240B29-F687-4f45-9708-019B960494DF}">
-                <a14:hiddenLine xmlns="" xmlns:a14="http://schemas.microsoft.com/office/drawing/2010/main" w="9525">
+                <a14:hiddenLine xmlns:a14="http://schemas.microsoft.com/office/drawing/2010/main" xmlns="" w="9525">
                   <a:solidFill>
                     <a:srgbClr val="000000"/>
                   </a:solidFill>
@@ -3326,7 +3433,7 @@
             </a:ln>
             <a:extLst>
               <a:ext uri="{91240B29-F687-4f45-9708-019B960494DF}">
-                <a14:hiddenLine xmlns="" xmlns:a14="http://schemas.microsoft.com/office/drawing/2010/main" w="9525">
+                <a14:hiddenLine xmlns:a14="http://schemas.microsoft.com/office/drawing/2010/main" xmlns="" w="9525">
                   <a:solidFill>
                     <a:srgbClr val="000000"/>
                   </a:solidFill>
@@ -3416,7 +3523,7 @@
             </a:ln>
             <a:extLst>
               <a:ext uri="{91240B29-F687-4f45-9708-019B960494DF}">
-                <a14:hiddenLine xmlns="" xmlns:a14="http://schemas.microsoft.com/office/drawing/2010/main" w="9525">
+                <a14:hiddenLine xmlns:a14="http://schemas.microsoft.com/office/drawing/2010/main" xmlns="" w="9525">
                   <a:solidFill>
                     <a:srgbClr val="000000"/>
                   </a:solidFill>
@@ -3478,7 +3585,7 @@
             </a:ln>
             <a:extLst>
               <a:ext uri="{91240B29-F687-4f45-9708-019B960494DF}">
-                <a14:hiddenLine xmlns="" xmlns:a14="http://schemas.microsoft.com/office/drawing/2010/main" w="9525">
+                <a14:hiddenLine xmlns:a14="http://schemas.microsoft.com/office/drawing/2010/main" xmlns="" w="9525">
                   <a:solidFill>
                     <a:srgbClr val="000000"/>
                   </a:solidFill>
@@ -3568,7 +3675,7 @@
             </a:ln>
             <a:extLst>
               <a:ext uri="{91240B29-F687-4f45-9708-019B960494DF}">
-                <a14:hiddenLine xmlns="" xmlns:a14="http://schemas.microsoft.com/office/drawing/2010/main" w="9525">
+                <a14:hiddenLine xmlns:a14="http://schemas.microsoft.com/office/drawing/2010/main" xmlns="" w="9525">
                   <a:solidFill>
                     <a:srgbClr val="000000"/>
                   </a:solidFill>
@@ -3602,7 +3709,7 @@
             </a:ln>
             <a:extLst>
               <a:ext uri="{91240B29-F687-4f45-9708-019B960494DF}">
-                <a14:hiddenLine xmlns="" xmlns:a14="http://schemas.microsoft.com/office/drawing/2010/main" w="9525">
+                <a14:hiddenLine xmlns:a14="http://schemas.microsoft.com/office/drawing/2010/main" xmlns="" w="9525">
                   <a:solidFill>
                     <a:srgbClr val="000000"/>
                   </a:solidFill>
@@ -3667,7 +3774,7 @@
             </a:ln>
             <a:extLst>
               <a:ext uri="{91240B29-F687-4f45-9708-019B960494DF}">
-                <a14:hiddenLine xmlns="" xmlns:a14="http://schemas.microsoft.com/office/drawing/2010/main" w="9525">
+                <a14:hiddenLine xmlns:a14="http://schemas.microsoft.com/office/drawing/2010/main" xmlns="" w="9525">
                   <a:solidFill>
                     <a:srgbClr val="000000"/>
                   </a:solidFill>
@@ -3757,7 +3864,7 @@
             </a:ln>
             <a:extLst>
               <a:ext uri="{91240B29-F687-4f45-9708-019B960494DF}">
-                <a14:hiddenLine xmlns="" xmlns:a14="http://schemas.microsoft.com/office/drawing/2010/main" w="9525">
+                <a14:hiddenLine xmlns:a14="http://schemas.microsoft.com/office/drawing/2010/main" xmlns="" w="9525">
                   <a:solidFill>
                     <a:srgbClr val="000000"/>
                   </a:solidFill>
@@ -3819,7 +3926,7 @@
             </a:ln>
             <a:extLst>
               <a:ext uri="{91240B29-F687-4f45-9708-019B960494DF}">
-                <a14:hiddenLine xmlns="" xmlns:a14="http://schemas.microsoft.com/office/drawing/2010/main" w="9525">
+                <a14:hiddenLine xmlns:a14="http://schemas.microsoft.com/office/drawing/2010/main" xmlns="" w="9525">
                   <a:solidFill>
                     <a:srgbClr val="000000"/>
                   </a:solidFill>
@@ -3909,7 +4016,7 @@
             </a:ln>
             <a:extLst>
               <a:ext uri="{91240B29-F687-4f45-9708-019B960494DF}">
-                <a14:hiddenLine xmlns="" xmlns:a14="http://schemas.microsoft.com/office/drawing/2010/main" w="9525">
+                <a14:hiddenLine xmlns:a14="http://schemas.microsoft.com/office/drawing/2010/main" xmlns="" w="9525">
                   <a:solidFill>
                     <a:srgbClr val="000000"/>
                   </a:solidFill>
@@ -3999,7 +4106,7 @@
             </a:ln>
             <a:extLst>
               <a:ext uri="{91240B29-F687-4f45-9708-019B960494DF}">
-                <a14:hiddenLine xmlns="" xmlns:a14="http://schemas.microsoft.com/office/drawing/2010/main" w="9525">
+                <a14:hiddenLine xmlns:a14="http://schemas.microsoft.com/office/drawing/2010/main" xmlns="" w="9525">
                   <a:solidFill>
                     <a:srgbClr val="000000"/>
                   </a:solidFill>
@@ -4064,7 +4171,7 @@
             </a:ln>
             <a:extLst>
               <a:ext uri="{91240B29-F687-4f45-9708-019B960494DF}">
-                <a14:hiddenLine xmlns="" xmlns:a14="http://schemas.microsoft.com/office/drawing/2010/main" w="9525">
+                <a14:hiddenLine xmlns:a14="http://schemas.microsoft.com/office/drawing/2010/main" xmlns="" w="9525">
                   <a:solidFill>
                     <a:srgbClr val="000000"/>
                   </a:solidFill>
@@ -4126,7 +4233,7 @@
             </a:ln>
             <a:extLst>
               <a:ext uri="{91240B29-F687-4f45-9708-019B960494DF}">
-                <a14:hiddenLine xmlns="" xmlns:a14="http://schemas.microsoft.com/office/drawing/2010/main" w="9525">
+                <a14:hiddenLine xmlns:a14="http://schemas.microsoft.com/office/drawing/2010/main" xmlns="" w="9525">
                   <a:solidFill>
                     <a:srgbClr val="000000"/>
                   </a:solidFill>
@@ -4216,7 +4323,7 @@
             </a:ln>
             <a:extLst>
               <a:ext uri="{91240B29-F687-4f45-9708-019B960494DF}">
-                <a14:hiddenLine xmlns="" xmlns:a14="http://schemas.microsoft.com/office/drawing/2010/main" w="9525">
+                <a14:hiddenLine xmlns:a14="http://schemas.microsoft.com/office/drawing/2010/main" xmlns="" w="9525">
                   <a:solidFill>
                     <a:srgbClr val="000000"/>
                   </a:solidFill>
@@ -4306,7 +4413,7 @@
             </a:ln>
             <a:extLst>
               <a:ext uri="{91240B29-F687-4f45-9708-019B960494DF}">
-                <a14:hiddenLine xmlns="" xmlns:a14="http://schemas.microsoft.com/office/drawing/2010/main" w="9525">
+                <a14:hiddenLine xmlns:a14="http://schemas.microsoft.com/office/drawing/2010/main" xmlns="" w="9525">
                   <a:solidFill>
                     <a:srgbClr val="000000"/>
                   </a:solidFill>
@@ -4368,7 +4475,7 @@
             </a:ln>
             <a:extLst>
               <a:ext uri="{91240B29-F687-4f45-9708-019B960494DF}">
-                <a14:hiddenLine xmlns="" xmlns:a14="http://schemas.microsoft.com/office/drawing/2010/main" w="9525">
+                <a14:hiddenLine xmlns:a14="http://schemas.microsoft.com/office/drawing/2010/main" xmlns="" w="9525">
                   <a:solidFill>
                     <a:srgbClr val="000000"/>
                   </a:solidFill>
@@ -4488,7 +4595,7 @@
             </a:ln>
             <a:extLst>
               <a:ext uri="{91240B29-F687-4f45-9708-019B960494DF}">
-                <a14:hiddenLine xmlns="" xmlns:a14="http://schemas.microsoft.com/office/drawing/2010/main" w="9525">
+                <a14:hiddenLine xmlns:a14="http://schemas.microsoft.com/office/drawing/2010/main" xmlns="" w="9525">
                   <a:solidFill>
                     <a:srgbClr val="000000"/>
                   </a:solidFill>
@@ -4556,7 +4663,7 @@
             </a:ln>
             <a:extLst>
               <a:ext uri="{91240B29-F687-4f45-9708-019B960494DF}">
-                <a14:hiddenLine xmlns="" xmlns:a14="http://schemas.microsoft.com/office/drawing/2010/main" w="9525">
+                <a14:hiddenLine xmlns:a14="http://schemas.microsoft.com/office/drawing/2010/main" xmlns="" w="9525">
                   <a:solidFill>
                     <a:srgbClr val="000000"/>
                   </a:solidFill>
@@ -4646,7 +4753,7 @@
             </a:ln>
             <a:extLst>
               <a:ext uri="{91240B29-F687-4f45-9708-019B960494DF}">
-                <a14:hiddenLine xmlns="" xmlns:a14="http://schemas.microsoft.com/office/drawing/2010/main" w="9525">
+                <a14:hiddenLine xmlns:a14="http://schemas.microsoft.com/office/drawing/2010/main" xmlns="" w="9525">
                   <a:solidFill>
                     <a:srgbClr val="000000"/>
                   </a:solidFill>
@@ -4786,7 +4893,7 @@
           <a:p>
             <a:fld id="{48A87A34-81AB-432B-8DAE-1953F412C126}" type="datetimeFigureOut">
               <a:rPr lang="en-US" smtClean="0"/>
-              <a:t>2/6/2019</a:t>
+              <a:t>2/8/2019</a:t>
             </a:fld>
             <a:endParaRPr lang="en-US" dirty="0"/>
           </a:p>
@@ -5053,7 +5160,7 @@
           <a:p>
             <a:fld id="{48A87A34-81AB-432B-8DAE-1953F412C126}" type="datetimeFigureOut">
               <a:rPr lang="en-US" smtClean="0"/>
-              <a:t>2/6/2019</a:t>
+              <a:t>2/8/2019</a:t>
             </a:fld>
             <a:endParaRPr lang="en-US" dirty="0"/>
           </a:p>
@@ -5249,7 +5356,7 @@
           <a:p>
             <a:fld id="{48A87A34-81AB-432B-8DAE-1953F412C126}" type="datetimeFigureOut">
               <a:rPr lang="en-US" smtClean="0"/>
-              <a:t>2/6/2019</a:t>
+              <a:t>2/8/2019</a:t>
             </a:fld>
             <a:endParaRPr lang="en-US" dirty="0"/>
           </a:p>
@@ -5512,7 +5619,7 @@
           <a:p>
             <a:fld id="{48A87A34-81AB-432B-8DAE-1953F412C126}" type="datetimeFigureOut">
               <a:rPr lang="en-US" smtClean="0"/>
-              <a:t>2/6/2019</a:t>
+              <a:t>2/8/2019</a:t>
             </a:fld>
             <a:endParaRPr lang="en-US" dirty="0"/>
           </a:p>
@@ -5946,7 +6053,7 @@
           <a:p>
             <a:fld id="{48A87A34-81AB-432B-8DAE-1953F412C126}" type="datetimeFigureOut">
               <a:rPr lang="en-US" smtClean="0"/>
-              <a:t>2/6/2019</a:t>
+              <a:t>2/8/2019</a:t>
             </a:fld>
             <a:endParaRPr lang="en-US" dirty="0"/>
           </a:p>
@@ -6492,7 +6599,7 @@
           <a:p>
             <a:fld id="{48A87A34-81AB-432B-8DAE-1953F412C126}" type="datetimeFigureOut">
               <a:rPr lang="en-US" smtClean="0"/>
-              <a:t>2/6/2019</a:t>
+              <a:t>2/8/2019</a:t>
             </a:fld>
             <a:endParaRPr lang="en-US" dirty="0"/>
           </a:p>
@@ -7212,7 +7319,7 @@
           <a:p>
             <a:fld id="{48A87A34-81AB-432B-8DAE-1953F412C126}" type="datetimeFigureOut">
               <a:rPr lang="en-US" smtClean="0"/>
-              <a:t>2/6/2019</a:t>
+              <a:t>2/8/2019</a:t>
             </a:fld>
             <a:endParaRPr lang="en-US" dirty="0"/>
           </a:p>
@@ -7382,7 +7489,7 @@
           <a:p>
             <a:fld id="{48A87A34-81AB-432B-8DAE-1953F412C126}" type="datetimeFigureOut">
               <a:rPr lang="en-US" smtClean="0"/>
-              <a:t>2/6/2019</a:t>
+              <a:t>2/8/2019</a:t>
             </a:fld>
             <a:endParaRPr lang="en-US" dirty="0"/>
           </a:p>
@@ -7562,7 +7669,7 @@
           <a:p>
             <a:fld id="{48A87A34-81AB-432B-8DAE-1953F412C126}" type="datetimeFigureOut">
               <a:rPr lang="en-US" smtClean="0"/>
-              <a:t>2/6/2019</a:t>
+              <a:t>2/8/2019</a:t>
             </a:fld>
             <a:endParaRPr lang="en-US" dirty="0"/>
           </a:p>
@@ -7732,7 +7839,7 @@
           <a:p>
             <a:fld id="{48A87A34-81AB-432B-8DAE-1953F412C126}" type="datetimeFigureOut">
               <a:rPr lang="en-US" smtClean="0"/>
-              <a:t>2/6/2019</a:t>
+              <a:t>2/8/2019</a:t>
             </a:fld>
             <a:endParaRPr lang="en-US" dirty="0"/>
           </a:p>
@@ -7982,7 +8089,7 @@
           <a:p>
             <a:fld id="{48A87A34-81AB-432B-8DAE-1953F412C126}" type="datetimeFigureOut">
               <a:rPr lang="en-US" smtClean="0"/>
-              <a:t>2/6/2019</a:t>
+              <a:t>2/8/2019</a:t>
             </a:fld>
             <a:endParaRPr lang="en-US" dirty="0"/>
           </a:p>
@@ -8214,7 +8321,7 @@
           <a:p>
             <a:fld id="{48A87A34-81AB-432B-8DAE-1953F412C126}" type="datetimeFigureOut">
               <a:rPr lang="en-US" smtClean="0"/>
-              <a:t>2/6/2019</a:t>
+              <a:t>2/8/2019</a:t>
             </a:fld>
             <a:endParaRPr lang="en-US" dirty="0"/>
           </a:p>
@@ -8595,7 +8702,7 @@
           <a:p>
             <a:fld id="{48A87A34-81AB-432B-8DAE-1953F412C126}" type="datetimeFigureOut">
               <a:rPr lang="en-US" smtClean="0"/>
-              <a:t>2/6/2019</a:t>
+              <a:t>2/8/2019</a:t>
             </a:fld>
             <a:endParaRPr lang="en-US" dirty="0"/>
           </a:p>
@@ -8713,7 +8820,7 @@
           <a:p>
             <a:fld id="{48A87A34-81AB-432B-8DAE-1953F412C126}" type="datetimeFigureOut">
               <a:rPr lang="en-US" smtClean="0"/>
-              <a:t>2/6/2019</a:t>
+              <a:t>2/8/2019</a:t>
             </a:fld>
             <a:endParaRPr lang="en-US" dirty="0"/>
           </a:p>
@@ -8808,7 +8915,7 @@
           <a:p>
             <a:fld id="{48A87A34-81AB-432B-8DAE-1953F412C126}" type="datetimeFigureOut">
               <a:rPr lang="en-US" smtClean="0"/>
-              <a:t>2/6/2019</a:t>
+              <a:t>2/8/2019</a:t>
             </a:fld>
             <a:endParaRPr lang="en-US" dirty="0"/>
           </a:p>
@@ -9057,7 +9164,7 @@
           <a:p>
             <a:fld id="{48A87A34-81AB-432B-8DAE-1953F412C126}" type="datetimeFigureOut">
               <a:rPr lang="en-US" smtClean="0"/>
-              <a:t>2/6/2019</a:t>
+              <a:t>2/8/2019</a:t>
             </a:fld>
             <a:endParaRPr lang="en-US" dirty="0"/>
           </a:p>
@@ -9337,7 +9444,7 @@
           <a:p>
             <a:fld id="{48A87A34-81AB-432B-8DAE-1953F412C126}" type="datetimeFigureOut">
               <a:rPr lang="en-US" smtClean="0"/>
-              <a:t>2/6/2019</a:t>
+              <a:t>2/8/2019</a:t>
             </a:fld>
             <a:endParaRPr lang="en-US" dirty="0"/>
           </a:p>
@@ -9460,7 +9567,7 @@
           <a:noFill/>
           <a:extLst>
             <a:ext uri="{909E8E84-426E-40dd-AFC4-6F175D3DCCD1}">
-              <a14:hiddenFill xmlns="" xmlns:a14="http://schemas.microsoft.com/office/drawing/2010/main">
+              <a14:hiddenFill xmlns:a14="http://schemas.microsoft.com/office/drawing/2010/main" xmlns="">
                 <a:solidFill>
                   <a:srgbClr val="FFFFFF"/>
                 </a:solidFill>
@@ -9534,7 +9641,7 @@
               </a:ln>
               <a:extLst>
                 <a:ext uri="{91240B29-F687-4f45-9708-019B960494DF}">
-                  <a14:hiddenLine xmlns="" xmlns:a14="http://schemas.microsoft.com/office/drawing/2010/main" w="9525">
+                  <a14:hiddenLine xmlns:a14="http://schemas.microsoft.com/office/drawing/2010/main" xmlns="" w="9525">
                     <a:solidFill>
                       <a:srgbClr val="000000"/>
                     </a:solidFill>
@@ -9624,7 +9731,7 @@
               </a:ln>
               <a:extLst>
                 <a:ext uri="{91240B29-F687-4f45-9708-019B960494DF}">
-                  <a14:hiddenLine xmlns="" xmlns:a14="http://schemas.microsoft.com/office/drawing/2010/main" w="9525">
+                  <a14:hiddenLine xmlns:a14="http://schemas.microsoft.com/office/drawing/2010/main" xmlns="" w="9525">
                     <a:solidFill>
                       <a:srgbClr val="000000"/>
                     </a:solidFill>
@@ -9714,7 +9821,7 @@
               </a:ln>
               <a:extLst>
                 <a:ext uri="{91240B29-F687-4f45-9708-019B960494DF}">
-                  <a14:hiddenLine xmlns="" xmlns:a14="http://schemas.microsoft.com/office/drawing/2010/main" w="9525">
+                  <a14:hiddenLine xmlns:a14="http://schemas.microsoft.com/office/drawing/2010/main" xmlns="" w="9525">
                     <a:solidFill>
                       <a:srgbClr val="000000"/>
                     </a:solidFill>
@@ -9776,7 +9883,7 @@
               </a:ln>
               <a:extLst>
                 <a:ext uri="{91240B29-F687-4f45-9708-019B960494DF}">
-                  <a14:hiddenLine xmlns="" xmlns:a14="http://schemas.microsoft.com/office/drawing/2010/main" w="9525">
+                  <a14:hiddenLine xmlns:a14="http://schemas.microsoft.com/office/drawing/2010/main" xmlns="" w="9525">
                     <a:solidFill>
                       <a:srgbClr val="000000"/>
                     </a:solidFill>
@@ -9866,7 +9973,7 @@
               </a:ln>
               <a:extLst>
                 <a:ext uri="{91240B29-F687-4f45-9708-019B960494DF}">
-                  <a14:hiddenLine xmlns="" xmlns:a14="http://schemas.microsoft.com/office/drawing/2010/main" w="9525">
+                  <a14:hiddenLine xmlns:a14="http://schemas.microsoft.com/office/drawing/2010/main" xmlns="" w="9525">
                     <a:solidFill>
                       <a:srgbClr val="000000"/>
                     </a:solidFill>
@@ -9928,7 +10035,7 @@
               </a:ln>
               <a:extLst>
                 <a:ext uri="{91240B29-F687-4f45-9708-019B960494DF}">
-                  <a14:hiddenLine xmlns="" xmlns:a14="http://schemas.microsoft.com/office/drawing/2010/main" w="9525">
+                  <a14:hiddenLine xmlns:a14="http://schemas.microsoft.com/office/drawing/2010/main" xmlns="" w="9525">
                     <a:solidFill>
                       <a:srgbClr val="000000"/>
                     </a:solidFill>
@@ -9990,7 +10097,7 @@
               </a:ln>
               <a:extLst>
                 <a:ext uri="{91240B29-F687-4f45-9708-019B960494DF}">
-                  <a14:hiddenLine xmlns="" xmlns:a14="http://schemas.microsoft.com/office/drawing/2010/main" w="9525">
+                  <a14:hiddenLine xmlns:a14="http://schemas.microsoft.com/office/drawing/2010/main" xmlns="" w="9525">
                     <a:solidFill>
                       <a:srgbClr val="000000"/>
                     </a:solidFill>
@@ -10080,7 +10187,7 @@
               </a:ln>
               <a:extLst>
                 <a:ext uri="{91240B29-F687-4f45-9708-019B960494DF}">
-                  <a14:hiddenLine xmlns="" xmlns:a14="http://schemas.microsoft.com/office/drawing/2010/main" w="9525">
+                  <a14:hiddenLine xmlns:a14="http://schemas.microsoft.com/office/drawing/2010/main" xmlns="" w="9525">
                     <a:solidFill>
                       <a:srgbClr val="000000"/>
                     </a:solidFill>
@@ -10170,7 +10277,7 @@
               </a:ln>
               <a:extLst>
                 <a:ext uri="{91240B29-F687-4f45-9708-019B960494DF}">
-                  <a14:hiddenLine xmlns="" xmlns:a14="http://schemas.microsoft.com/office/drawing/2010/main" w="9525">
+                  <a14:hiddenLine xmlns:a14="http://schemas.microsoft.com/office/drawing/2010/main" xmlns="" w="9525">
                     <a:solidFill>
                       <a:srgbClr val="000000"/>
                     </a:solidFill>
@@ -10232,7 +10339,7 @@
               </a:ln>
               <a:extLst>
                 <a:ext uri="{91240B29-F687-4f45-9708-019B960494DF}">
-                  <a14:hiddenLine xmlns="" xmlns:a14="http://schemas.microsoft.com/office/drawing/2010/main" w="9525">
+                  <a14:hiddenLine xmlns:a14="http://schemas.microsoft.com/office/drawing/2010/main" xmlns="" w="9525">
                     <a:solidFill>
                       <a:srgbClr val="000000"/>
                     </a:solidFill>
@@ -10342,7 +10449,7 @@
               </a:ln>
               <a:extLst>
                 <a:ext uri="{91240B29-F687-4f45-9708-019B960494DF}">
-                  <a14:hiddenLine xmlns="" xmlns:a14="http://schemas.microsoft.com/office/drawing/2010/main" w="9525">
+                  <a14:hiddenLine xmlns:a14="http://schemas.microsoft.com/office/drawing/2010/main" xmlns="" w="9525">
                     <a:solidFill>
                       <a:srgbClr val="000000"/>
                     </a:solidFill>
@@ -10426,7 +10533,7 @@
               </a:ln>
               <a:extLst>
                 <a:ext uri="{91240B29-F687-4f45-9708-019B960494DF}">
-                  <a14:hiddenLine xmlns="" xmlns:a14="http://schemas.microsoft.com/office/drawing/2010/main" w="9525">
+                  <a14:hiddenLine xmlns:a14="http://schemas.microsoft.com/office/drawing/2010/main" xmlns="" w="9525">
                     <a:solidFill>
                       <a:srgbClr val="000000"/>
                     </a:solidFill>
@@ -10488,7 +10595,7 @@
               </a:ln>
               <a:extLst>
                 <a:ext uri="{91240B29-F687-4f45-9708-019B960494DF}">
-                  <a14:hiddenLine xmlns="" xmlns:a14="http://schemas.microsoft.com/office/drawing/2010/main" w="9525">
+                  <a14:hiddenLine xmlns:a14="http://schemas.microsoft.com/office/drawing/2010/main" xmlns="" w="9525">
                     <a:solidFill>
                       <a:srgbClr val="000000"/>
                     </a:solidFill>
@@ -10550,7 +10657,7 @@
               </a:ln>
               <a:extLst>
                 <a:ext uri="{91240B29-F687-4f45-9708-019B960494DF}">
-                  <a14:hiddenLine xmlns="" xmlns:a14="http://schemas.microsoft.com/office/drawing/2010/main" w="9525">
+                  <a14:hiddenLine xmlns:a14="http://schemas.microsoft.com/office/drawing/2010/main" xmlns="" w="9525">
                     <a:solidFill>
                       <a:srgbClr val="000000"/>
                     </a:solidFill>
@@ -10640,7 +10747,7 @@
               </a:ln>
               <a:extLst>
                 <a:ext uri="{91240B29-F687-4f45-9708-019B960494DF}">
-                  <a14:hiddenLine xmlns="" xmlns:a14="http://schemas.microsoft.com/office/drawing/2010/main" w="9525">
+                  <a14:hiddenLine xmlns:a14="http://schemas.microsoft.com/office/drawing/2010/main" xmlns="" w="9525">
                     <a:solidFill>
                       <a:srgbClr val="000000"/>
                     </a:solidFill>
@@ -10674,7 +10781,7 @@
               </a:ln>
               <a:extLst>
                 <a:ext uri="{91240B29-F687-4f45-9708-019B960494DF}">
-                  <a14:hiddenLine xmlns="" xmlns:a14="http://schemas.microsoft.com/office/drawing/2010/main" w="9525">
+                  <a14:hiddenLine xmlns:a14="http://schemas.microsoft.com/office/drawing/2010/main" xmlns="" w="9525">
                     <a:solidFill>
                       <a:srgbClr val="000000"/>
                     </a:solidFill>
@@ -10739,7 +10846,7 @@
               </a:ln>
               <a:extLst>
                 <a:ext uri="{91240B29-F687-4f45-9708-019B960494DF}">
-                  <a14:hiddenLine xmlns="" xmlns:a14="http://schemas.microsoft.com/office/drawing/2010/main" w="9525">
+                  <a14:hiddenLine xmlns:a14="http://schemas.microsoft.com/office/drawing/2010/main" xmlns="" w="9525">
                     <a:solidFill>
                       <a:srgbClr val="000000"/>
                     </a:solidFill>
@@ -10829,7 +10936,7 @@
               </a:ln>
               <a:extLst>
                 <a:ext uri="{91240B29-F687-4f45-9708-019B960494DF}">
-                  <a14:hiddenLine xmlns="" xmlns:a14="http://schemas.microsoft.com/office/drawing/2010/main" w="9525">
+                  <a14:hiddenLine xmlns:a14="http://schemas.microsoft.com/office/drawing/2010/main" xmlns="" w="9525">
                     <a:solidFill>
                       <a:srgbClr val="000000"/>
                     </a:solidFill>
@@ -10891,7 +10998,7 @@
               </a:ln>
               <a:extLst>
                 <a:ext uri="{91240B29-F687-4f45-9708-019B960494DF}">
-                  <a14:hiddenLine xmlns="" xmlns:a14="http://schemas.microsoft.com/office/drawing/2010/main" w="9525">
+                  <a14:hiddenLine xmlns:a14="http://schemas.microsoft.com/office/drawing/2010/main" xmlns="" w="9525">
                     <a:solidFill>
                       <a:srgbClr val="000000"/>
                     </a:solidFill>
@@ -10981,7 +11088,7 @@
               </a:ln>
               <a:extLst>
                 <a:ext uri="{91240B29-F687-4f45-9708-019B960494DF}">
-                  <a14:hiddenLine xmlns="" xmlns:a14="http://schemas.microsoft.com/office/drawing/2010/main" w="9525">
+                  <a14:hiddenLine xmlns:a14="http://schemas.microsoft.com/office/drawing/2010/main" xmlns="" w="9525">
                     <a:solidFill>
                       <a:srgbClr val="000000"/>
                     </a:solidFill>
@@ -11046,7 +11153,7 @@
               </a:ln>
               <a:extLst>
                 <a:ext uri="{91240B29-F687-4f45-9708-019B960494DF}">
-                  <a14:hiddenLine xmlns="" xmlns:a14="http://schemas.microsoft.com/office/drawing/2010/main" w="9525">
+                  <a14:hiddenLine xmlns:a14="http://schemas.microsoft.com/office/drawing/2010/main" xmlns="" w="9525">
                     <a:solidFill>
                       <a:srgbClr val="000000"/>
                     </a:solidFill>
@@ -11108,7 +11215,7 @@
               </a:ln>
               <a:extLst>
                 <a:ext uri="{91240B29-F687-4f45-9708-019B960494DF}">
-                  <a14:hiddenLine xmlns="" xmlns:a14="http://schemas.microsoft.com/office/drawing/2010/main" w="9525">
+                  <a14:hiddenLine xmlns:a14="http://schemas.microsoft.com/office/drawing/2010/main" xmlns="" w="9525">
                     <a:solidFill>
                       <a:srgbClr val="000000"/>
                     </a:solidFill>
@@ -11198,7 +11305,7 @@
               </a:ln>
               <a:extLst>
                 <a:ext uri="{91240B29-F687-4f45-9708-019B960494DF}">
-                  <a14:hiddenLine xmlns="" xmlns:a14="http://schemas.microsoft.com/office/drawing/2010/main" w="9525">
+                  <a14:hiddenLine xmlns:a14="http://schemas.microsoft.com/office/drawing/2010/main" xmlns="" w="9525">
                     <a:solidFill>
                       <a:srgbClr val="000000"/>
                     </a:solidFill>
@@ -11288,7 +11395,7 @@
               </a:ln>
               <a:extLst>
                 <a:ext uri="{91240B29-F687-4f45-9708-019B960494DF}">
-                  <a14:hiddenLine xmlns="" xmlns:a14="http://schemas.microsoft.com/office/drawing/2010/main" w="9525">
+                  <a14:hiddenLine xmlns:a14="http://schemas.microsoft.com/office/drawing/2010/main" xmlns="" w="9525">
                     <a:solidFill>
                       <a:srgbClr val="000000"/>
                     </a:solidFill>
@@ -11353,7 +11460,7 @@
               </a:ln>
               <a:extLst>
                 <a:ext uri="{91240B29-F687-4f45-9708-019B960494DF}">
-                  <a14:hiddenLine xmlns="" xmlns:a14="http://schemas.microsoft.com/office/drawing/2010/main" w="9525">
+                  <a14:hiddenLine xmlns:a14="http://schemas.microsoft.com/office/drawing/2010/main" xmlns="" w="9525">
                     <a:solidFill>
                       <a:srgbClr val="000000"/>
                     </a:solidFill>
@@ -11473,7 +11580,7 @@
               </a:ln>
               <a:extLst>
                 <a:ext uri="{91240B29-F687-4f45-9708-019B960494DF}">
-                  <a14:hiddenLine xmlns="" xmlns:a14="http://schemas.microsoft.com/office/drawing/2010/main" w="9525">
+                  <a14:hiddenLine xmlns:a14="http://schemas.microsoft.com/office/drawing/2010/main" xmlns="" w="9525">
                     <a:solidFill>
                       <a:srgbClr val="000000"/>
                     </a:solidFill>
@@ -11554,7 +11661,7 @@
               </a:ln>
               <a:extLst>
                 <a:ext uri="{91240B29-F687-4f45-9708-019B960494DF}">
-                  <a14:hiddenLine xmlns="" xmlns:a14="http://schemas.microsoft.com/office/drawing/2010/main" w="9525">
+                  <a14:hiddenLine xmlns:a14="http://schemas.microsoft.com/office/drawing/2010/main" xmlns="" w="9525">
                     <a:solidFill>
                       <a:srgbClr val="000000"/>
                     </a:solidFill>
@@ -11669,7 +11776,7 @@
               </a:ln>
               <a:extLst>
                 <a:ext uri="{91240B29-F687-4f45-9708-019B960494DF}">
-                  <a14:hiddenLine xmlns="" xmlns:a14="http://schemas.microsoft.com/office/drawing/2010/main" w="9525">
+                  <a14:hiddenLine xmlns:a14="http://schemas.microsoft.com/office/drawing/2010/main" xmlns="" w="9525">
                     <a:solidFill>
                       <a:srgbClr val="000000"/>
                     </a:solidFill>
@@ -11759,7 +11866,7 @@
               </a:ln>
               <a:extLst>
                 <a:ext uri="{91240B29-F687-4f45-9708-019B960494DF}">
-                  <a14:hiddenLine xmlns="" xmlns:a14="http://schemas.microsoft.com/office/drawing/2010/main" w="9525">
+                  <a14:hiddenLine xmlns:a14="http://schemas.microsoft.com/office/drawing/2010/main" xmlns="" w="9525">
                     <a:solidFill>
                       <a:srgbClr val="000000"/>
                     </a:solidFill>
@@ -11824,7 +11931,7 @@
               </a:ln>
               <a:extLst>
                 <a:ext uri="{91240B29-F687-4f45-9708-019B960494DF}">
-                  <a14:hiddenLine xmlns="" xmlns:a14="http://schemas.microsoft.com/office/drawing/2010/main" w="9525">
+                  <a14:hiddenLine xmlns:a14="http://schemas.microsoft.com/office/drawing/2010/main" xmlns="" w="9525">
                     <a:solidFill>
                       <a:srgbClr val="000000"/>
                     </a:solidFill>
@@ -11914,7 +12021,7 @@
               </a:ln>
               <a:extLst>
                 <a:ext uri="{91240B29-F687-4f45-9708-019B960494DF}">
-                  <a14:hiddenLine xmlns="" xmlns:a14="http://schemas.microsoft.com/office/drawing/2010/main" w="9525">
+                  <a14:hiddenLine xmlns:a14="http://schemas.microsoft.com/office/drawing/2010/main" xmlns="" w="9525">
                     <a:solidFill>
                       <a:srgbClr val="000000"/>
                     </a:solidFill>
@@ -11982,7 +12089,7 @@
               </a:ln>
               <a:extLst>
                 <a:ext uri="{91240B29-F687-4f45-9708-019B960494DF}">
-                  <a14:hiddenLine xmlns="" xmlns:a14="http://schemas.microsoft.com/office/drawing/2010/main" w="9525">
+                  <a14:hiddenLine xmlns:a14="http://schemas.microsoft.com/office/drawing/2010/main" xmlns="" w="9525">
                     <a:solidFill>
                       <a:srgbClr val="000000"/>
                     </a:solidFill>
@@ -12072,7 +12179,7 @@
               </a:ln>
               <a:extLst>
                 <a:ext uri="{91240B29-F687-4f45-9708-019B960494DF}">
-                  <a14:hiddenLine xmlns="" xmlns:a14="http://schemas.microsoft.com/office/drawing/2010/main" w="9525">
+                  <a14:hiddenLine xmlns:a14="http://schemas.microsoft.com/office/drawing/2010/main" xmlns="" w="9525">
                     <a:solidFill>
                       <a:srgbClr val="000000"/>
                     </a:solidFill>
@@ -12140,7 +12247,7 @@
               </a:ln>
               <a:extLst>
                 <a:ext uri="{91240B29-F687-4f45-9708-019B960494DF}">
-                  <a14:hiddenLine xmlns="" xmlns:a14="http://schemas.microsoft.com/office/drawing/2010/main" w="9525">
+                  <a14:hiddenLine xmlns:a14="http://schemas.microsoft.com/office/drawing/2010/main" xmlns="" w="9525">
                     <a:solidFill>
                       <a:srgbClr val="000000"/>
                     </a:solidFill>
@@ -12230,7 +12337,7 @@
               </a:ln>
               <a:extLst>
                 <a:ext uri="{91240B29-F687-4f45-9708-019B960494DF}">
-                  <a14:hiddenLine xmlns="" xmlns:a14="http://schemas.microsoft.com/office/drawing/2010/main" w="9525">
+                  <a14:hiddenLine xmlns:a14="http://schemas.microsoft.com/office/drawing/2010/main" xmlns="" w="9525">
                     <a:solidFill>
                       <a:srgbClr val="000000"/>
                     </a:solidFill>
@@ -12264,7 +12371,7 @@
               </a:ln>
               <a:extLst>
                 <a:ext uri="{91240B29-F687-4f45-9708-019B960494DF}">
-                  <a14:hiddenLine xmlns="" xmlns:a14="http://schemas.microsoft.com/office/drawing/2010/main" w="9525">
+                  <a14:hiddenLine xmlns:a14="http://schemas.microsoft.com/office/drawing/2010/main" xmlns="" w="9525">
                     <a:solidFill>
                       <a:srgbClr val="000000"/>
                     </a:solidFill>
@@ -12405,7 +12512,7 @@
             <a:fld id="{48A87A34-81AB-432B-8DAE-1953F412C126}" type="datetimeFigureOut">
               <a:rPr lang="en-US" smtClean="0"/>
               <a:pPr/>
-              <a:t>2/6/2019</a:t>
+              <a:t>2/8/2019</a:t>
             </a:fld>
             <a:endParaRPr lang="en-US" dirty="0"/>
           </a:p>
@@ -12999,7 +13106,7 @@
             <a:noFill/>
             <a:extLst>
               <a:ext uri="{909E8E84-426E-40dd-AFC4-6F175D3DCCD1}">
-                <a14:hiddenFill xmlns="" xmlns:a16="http://schemas.microsoft.com/office/drawing/2014/main" xmlns:a14="http://schemas.microsoft.com/office/drawing/2010/main" xmlns:p14="http://schemas.microsoft.com/office/powerpoint/2010/main">
+                <a14:hiddenFill xmlns:p14="http://schemas.microsoft.com/office/powerpoint/2010/main" xmlns:a14="http://schemas.microsoft.com/office/drawing/2010/main" xmlns:a16="http://schemas.microsoft.com/office/drawing/2014/main" xmlns="">
                   <a:solidFill>
                     <a:srgbClr val="FFFFFF"/>
                   </a:solidFill>
@@ -15288,6 +15395,270 @@
 </file>
 
 <file path=ppt/slides/slide10.xml><?xml version="1.0" encoding="utf-8"?>
+<p:sld xmlns:a="http://schemas.openxmlformats.org/drawingml/2006/main" xmlns:r="http://schemas.openxmlformats.org/officeDocument/2006/relationships" xmlns:p="http://schemas.openxmlformats.org/presentationml/2006/main">
+  <p:cSld>
+    <p:spTree>
+      <p:nvGrpSpPr>
+        <p:cNvPr id="1" name=""/>
+        <p:cNvGrpSpPr/>
+        <p:nvPr/>
+      </p:nvGrpSpPr>
+      <p:grpSpPr>
+        <a:xfrm>
+          <a:off x="0" y="0"/>
+          <a:ext cx="0" cy="0"/>
+          <a:chOff x="0" y="0"/>
+          <a:chExt cx="0" cy="0"/>
+        </a:xfrm>
+      </p:grpSpPr>
+      <p:sp>
+        <p:nvSpPr>
+          <p:cNvPr id="5" name="Title 4">
+            <a:extLst>
+              <a:ext uri="{FF2B5EF4-FFF2-40B4-BE49-F238E27FC236}">
+                <a16:creationId xmlns:a16="http://schemas.microsoft.com/office/drawing/2014/main" id="{72572555-CF2F-4174-906F-00B902D80148}"/>
+              </a:ext>
+            </a:extLst>
+          </p:cNvPr>
+          <p:cNvSpPr>
+            <a:spLocks noGrp="1"/>
+          </p:cNvSpPr>
+          <p:nvPr>
+            <p:ph type="title"/>
+          </p:nvPr>
+        </p:nvSpPr>
+        <p:spPr/>
+        <p:txBody>
+          <a:bodyPr/>
+          <a:lstStyle/>
+          <a:p>
+            <a:r>
+              <a:rPr lang="de-DE" dirty="0" err="1"/>
+              <a:t>Progetto</a:t>
+            </a:r>
+            <a:r>
+              <a:rPr lang="de-DE" dirty="0"/>
+              <a:t> d</a:t>
+            </a:r>
+            <a:r>
+              <a:rPr lang="en-GB" dirty="0"/>
+              <a:t>’</a:t>
+            </a:r>
+            <a:r>
+              <a:rPr lang="en-GB" dirty="0" err="1"/>
+              <a:t>esempio</a:t>
+            </a:r>
+            <a:r>
+              <a:rPr lang="en-GB" dirty="0"/>
+              <a:t>: Explorer	</a:t>
+            </a:r>
+            <a:endParaRPr lang="it-IT" dirty="0"/>
+          </a:p>
+        </p:txBody>
+      </p:sp>
+      <p:sp>
+        <p:nvSpPr>
+          <p:cNvPr id="6" name="Content Placeholder 5">
+            <a:extLst>
+              <a:ext uri="{FF2B5EF4-FFF2-40B4-BE49-F238E27FC236}">
+                <a16:creationId xmlns:a16="http://schemas.microsoft.com/office/drawing/2014/main" id="{8986C421-BA99-4203-B38C-67310EBE8ADD}"/>
+              </a:ext>
+            </a:extLst>
+          </p:cNvPr>
+          <p:cNvSpPr>
+            <a:spLocks noGrp="1"/>
+          </p:cNvSpPr>
+          <p:nvPr>
+            <p:ph idx="1"/>
+          </p:nvPr>
+        </p:nvSpPr>
+        <p:spPr/>
+        <p:txBody>
+          <a:bodyPr/>
+          <a:lstStyle/>
+          <a:p>
+            <a:r>
+              <a:rPr lang="en-GB" dirty="0"/>
+              <a:t>Robot </a:t>
+            </a:r>
+            <a:r>
+              <a:rPr lang="en-GB" dirty="0" err="1"/>
+              <a:t>che</a:t>
+            </a:r>
+            <a:r>
+              <a:rPr lang="en-GB" dirty="0"/>
+              <a:t> </a:t>
+            </a:r>
+            <a:r>
+              <a:rPr lang="en-GB" dirty="0" err="1"/>
+              <a:t>esplora</a:t>
+            </a:r>
+            <a:r>
+              <a:rPr lang="en-GB" dirty="0"/>
+              <a:t> </a:t>
+            </a:r>
+            <a:r>
+              <a:rPr lang="en-GB" dirty="0" err="1"/>
+              <a:t>il</a:t>
+            </a:r>
+            <a:r>
+              <a:rPr lang="en-GB" dirty="0"/>
+              <a:t> campo </a:t>
+            </a:r>
+            <a:r>
+              <a:rPr lang="en-GB" dirty="0" err="1"/>
+              <a:t>attorno</a:t>
+            </a:r>
+            <a:r>
+              <a:rPr lang="en-GB" dirty="0"/>
+              <a:t> a se</a:t>
+            </a:r>
+          </a:p>
+          <a:p>
+            <a:r>
+              <a:rPr lang="en-GB" dirty="0" err="1"/>
+              <a:t>Usa</a:t>
+            </a:r>
+            <a:r>
+              <a:rPr lang="en-GB" dirty="0"/>
+              <a:t> 2 </a:t>
+            </a:r>
+            <a:r>
+              <a:rPr lang="en-GB" dirty="0" err="1"/>
+              <a:t>bottoni</a:t>
+            </a:r>
+            <a:r>
+              <a:rPr lang="en-GB" dirty="0"/>
+              <a:t>, 1 </a:t>
+            </a:r>
+            <a:r>
+              <a:rPr lang="en-GB" dirty="0" err="1"/>
+              <a:t>sensore</a:t>
+            </a:r>
+            <a:r>
+              <a:rPr lang="en-GB" dirty="0"/>
+              <a:t> di </a:t>
+            </a:r>
+            <a:r>
+              <a:rPr lang="en-GB" dirty="0" err="1"/>
+              <a:t>ultrasuoni</a:t>
+            </a:r>
+            <a:r>
+              <a:rPr lang="en-GB" dirty="0"/>
+              <a:t> e 1 </a:t>
+            </a:r>
+            <a:r>
+              <a:rPr lang="en-GB" dirty="0" err="1"/>
+              <a:t>sensore</a:t>
+            </a:r>
+            <a:r>
+              <a:rPr lang="en-GB" dirty="0"/>
+              <a:t> di luce</a:t>
+            </a:r>
+          </a:p>
+          <a:p>
+            <a:endParaRPr lang="it-IT" dirty="0"/>
+          </a:p>
+        </p:txBody>
+      </p:sp>
+    </p:spTree>
+    <p:extLst>
+      <p:ext uri="{BB962C8B-B14F-4D97-AF65-F5344CB8AC3E}">
+        <p14:creationId xmlns:p14="http://schemas.microsoft.com/office/powerpoint/2010/main" val="1216392548"/>
+      </p:ext>
+    </p:extLst>
+  </p:cSld>
+  <p:clrMapOvr>
+    <a:masterClrMapping/>
+  </p:clrMapOvr>
+</p:sld>
+</file>
+
+<file path=ppt/slides/slide11.xml><?xml version="1.0" encoding="utf-8"?>
+<p:sld xmlns:a="http://schemas.openxmlformats.org/drawingml/2006/main" xmlns:r="http://schemas.openxmlformats.org/officeDocument/2006/relationships" xmlns:p="http://schemas.openxmlformats.org/presentationml/2006/main">
+  <p:cSld>
+    <p:spTree>
+      <p:nvGrpSpPr>
+        <p:cNvPr id="1" name=""/>
+        <p:cNvGrpSpPr/>
+        <p:nvPr/>
+      </p:nvGrpSpPr>
+      <p:grpSpPr>
+        <a:xfrm>
+          <a:off x="0" y="0"/>
+          <a:ext cx="0" cy="0"/>
+          <a:chOff x="0" y="0"/>
+          <a:chExt cx="0" cy="0"/>
+        </a:xfrm>
+      </p:grpSpPr>
+      <p:sp>
+        <p:nvSpPr>
+          <p:cNvPr id="2" name="Title 1">
+            <a:extLst>
+              <a:ext uri="{FF2B5EF4-FFF2-40B4-BE49-F238E27FC236}">
+                <a16:creationId xmlns:a16="http://schemas.microsoft.com/office/drawing/2014/main" id="{54866145-9618-4B21-9227-E43D54E458C5}"/>
+              </a:ext>
+            </a:extLst>
+          </p:cNvPr>
+          <p:cNvSpPr>
+            <a:spLocks noGrp="1"/>
+          </p:cNvSpPr>
+          <p:nvPr>
+            <p:ph type="title"/>
+          </p:nvPr>
+        </p:nvSpPr>
+        <p:spPr/>
+        <p:txBody>
+          <a:bodyPr/>
+          <a:lstStyle/>
+          <a:p>
+            <a:r>
+              <a:rPr lang="en-GB" dirty="0" err="1"/>
+              <a:t>Conclusione</a:t>
+            </a:r>
+            <a:endParaRPr lang="it-IT" dirty="0"/>
+          </a:p>
+        </p:txBody>
+      </p:sp>
+      <p:sp>
+        <p:nvSpPr>
+          <p:cNvPr id="3" name="Content Placeholder 2">
+            <a:extLst>
+              <a:ext uri="{FF2B5EF4-FFF2-40B4-BE49-F238E27FC236}">
+                <a16:creationId xmlns:a16="http://schemas.microsoft.com/office/drawing/2014/main" id="{67AD95FB-7037-47B4-8C59-8DDAEA277335}"/>
+              </a:ext>
+            </a:extLst>
+          </p:cNvPr>
+          <p:cNvSpPr>
+            <a:spLocks noGrp="1"/>
+          </p:cNvSpPr>
+          <p:nvPr>
+            <p:ph idx="1"/>
+          </p:nvPr>
+        </p:nvSpPr>
+        <p:spPr/>
+        <p:txBody>
+          <a:bodyPr/>
+          <a:lstStyle/>
+          <a:p>
+            <a:endParaRPr lang="it-IT" dirty="0"/>
+          </a:p>
+        </p:txBody>
+      </p:sp>
+    </p:spTree>
+    <p:extLst>
+      <p:ext uri="{BB962C8B-B14F-4D97-AF65-F5344CB8AC3E}">
+        <p14:creationId xmlns:p14="http://schemas.microsoft.com/office/powerpoint/2010/main" val="3336828856"/>
+      </p:ext>
+    </p:extLst>
+  </p:cSld>
+  <p:clrMapOvr>
+    <a:masterClrMapping/>
+  </p:clrMapOvr>
+</p:sld>
+</file>
+
+<file path=ppt/slides/slide12.xml><?xml version="1.0" encoding="utf-8"?>
 <p:sld xmlns:a="http://schemas.openxmlformats.org/drawingml/2006/main" xmlns:r="http://schemas.openxmlformats.org/officeDocument/2006/relationships" xmlns:p="http://schemas.openxmlformats.org/presentationml/2006/main">
   <p:cSld>
     <p:spTree>
@@ -17007,23 +17378,6 @@
 </file>
 
 <file path=customXml/item1.xml><?xml version="1.0" encoding="utf-8"?>
-<p:properties xmlns:p="http://schemas.microsoft.com/office/2006/metadata/properties" xmlns:xsi="http://www.w3.org/2001/XMLSchema-instance" xmlns:pc="http://schemas.microsoft.com/office/infopath/2007/PartnerControls">
-  <documentManagement>
-    <MediaServiceKeyPoints xmlns="71af3243-3dd4-4a8d-8c0d-dd76da1f02a5" xsi:nil="true"/>
-  </documentManagement>
-</p:properties>
-</file>
-
-<file path=customXml/item2.xml><?xml version="1.0" encoding="utf-8"?>
-<?mso-contentType ?>
-<FormTemplates xmlns="http://schemas.microsoft.com/sharepoint/v3/contenttype/forms">
-  <Display>DocumentLibraryForm</Display>
-  <Edit>DocumentLibraryForm</Edit>
-  <New>DocumentLibraryForm</New>
-</FormTemplates>
-</file>
-
-<file path=customXml/item3.xml><?xml version="1.0" encoding="utf-8"?>
 <ct:contentTypeSchema xmlns:ct="http://schemas.microsoft.com/office/2006/metadata/contentType" xmlns:ma="http://schemas.microsoft.com/office/2006/metadata/properties/metaAttributes" ct:_="" ma:_="" ma:contentTypeName="Document" ma:contentTypeID="0x01010079F111ED35F8CC479449609E8A0923A6" ma:contentTypeVersion="11" ma:contentTypeDescription="Create a new document." ma:contentTypeScope="" ma:versionID="1c2eb7a32e66fb6e4260f3771546a5e2">
   <xsd:schema xmlns:xsd="http://www.w3.org/2001/XMLSchema" xmlns:xs="http://www.w3.org/2001/XMLSchema" xmlns:p="http://schemas.microsoft.com/office/2006/metadata/properties" xmlns:ns2="71af3243-3dd4-4a8d-8c0d-dd76da1f02a5" xmlns:ns3="16c05727-aa75-4e4a-9b5f-8a80a1165891" targetNamespace="http://schemas.microsoft.com/office/2006/metadata/properties" ma:root="true" ma:fieldsID="04e1f6479c48b08974ba73b5ca973489" ns2:_="" ns3:_="">
     <xsd:import namespace="71af3243-3dd4-4a8d-8c0d-dd76da1f02a5"/>
@@ -17234,25 +17588,24 @@
 </ct:contentTypeSchema>
 </file>
 
-<file path=customXml/itemProps1.xml><?xml version="1.0" encoding="utf-8"?>
-<ds:datastoreItem xmlns:ds="http://schemas.openxmlformats.org/officeDocument/2006/customXml" ds:itemID="{83E9F5BB-97DB-4160-B47A-8FCEBC4F46E5}">
-  <ds:schemaRefs>
-    <ds:schemaRef ds:uri="http://schemas.microsoft.com/office/2006/metadata/properties"/>
-    <ds:schemaRef ds:uri="http://schemas.microsoft.com/office/infopath/2007/PartnerControls"/>
-    <ds:schemaRef ds:uri="71af3243-3dd4-4a8d-8c0d-dd76da1f02a5"/>
-  </ds:schemaRefs>
-</ds:datastoreItem>
+<file path=customXml/item2.xml><?xml version="1.0" encoding="utf-8"?>
+<?mso-contentType ?>
+<FormTemplates xmlns="http://schemas.microsoft.com/sharepoint/v3/contenttype/forms">
+  <Display>DocumentLibraryForm</Display>
+  <Edit>DocumentLibraryForm</Edit>
+  <New>DocumentLibraryForm</New>
+</FormTemplates>
 </file>
 
-<file path=customXml/itemProps2.xml><?xml version="1.0" encoding="utf-8"?>
-<ds:datastoreItem xmlns:ds="http://schemas.openxmlformats.org/officeDocument/2006/customXml" ds:itemID="{3545AAC2-3D9B-47D1-B22C-F3D1B3D4DEA8}">
-  <ds:schemaRefs>
-    <ds:schemaRef ds:uri="http://schemas.microsoft.com/sharepoint/v3/contenttype/forms"/>
-  </ds:schemaRefs>
-</ds:datastoreItem>
+<file path=customXml/item3.xml><?xml version="1.0" encoding="utf-8"?>
+<p:properties xmlns:p="http://schemas.microsoft.com/office/2006/metadata/properties" xmlns:xsi="http://www.w3.org/2001/XMLSchema-instance" xmlns:pc="http://schemas.microsoft.com/office/infopath/2007/PartnerControls">
+  <documentManagement>
+    <MediaServiceKeyPoints xmlns="71af3243-3dd4-4a8d-8c0d-dd76da1f02a5" xsi:nil="true"/>
+  </documentManagement>
+</p:properties>
 </file>
 
-<file path=customXml/itemProps3.xml><?xml version="1.0" encoding="utf-8"?>
+<file path=customXml/itemProps1.xml><?xml version="1.0" encoding="utf-8"?>
 <ds:datastoreItem xmlns:ds="http://schemas.openxmlformats.org/officeDocument/2006/customXml" ds:itemID="{D35D4F14-B0CC-4BD5-A6F5-6EB7AE97AF0B}">
   <ds:schemaRefs>
     <ds:schemaRef ds:uri="http://schemas.microsoft.com/office/2006/metadata/contentType"/>
@@ -17269,4 +17622,22 @@
     <ds:schemaRef ds:uri="http://schemas.microsoft.com/internal/obd"/>
   </ds:schemaRefs>
 </ds:datastoreItem>
+</file>
+
+<file path=customXml/itemProps2.xml><?xml version="1.0" encoding="utf-8"?>
+<ds:datastoreItem xmlns:ds="http://schemas.openxmlformats.org/officeDocument/2006/customXml" ds:itemID="{3545AAC2-3D9B-47D1-B22C-F3D1B3D4DEA8}">
+  <ds:schemaRefs>
+    <ds:schemaRef ds:uri="http://schemas.microsoft.com/sharepoint/v3/contenttype/forms"/>
+  </ds:schemaRefs>
+</ds:datastoreItem>
+</file>
+
+<file path=customXml/itemProps3.xml><?xml version="1.0" encoding="utf-8"?>
+<ds:datastoreItem xmlns:ds="http://schemas.openxmlformats.org/officeDocument/2006/customXml" ds:itemID="{83E9F5BB-97DB-4160-B47A-8FCEBC4F46E5}">
+  <ds:schemaRefs>
+    <ds:schemaRef ds:uri="http://schemas.microsoft.com/office/2006/metadata/properties"/>
+    <ds:schemaRef ds:uri="http://schemas.microsoft.com/office/infopath/2007/PartnerControls"/>
+    <ds:schemaRef ds:uri="71af3243-3dd4-4a8d-8c0d-dd76da1f02a5"/>
+  </ds:schemaRefs>
+</ds:datastoreItem>
 </file>
</xml_diff>